<commit_message>
add chinese version of the pin_map
</commit_message>
<xml_diff>
--- a/img/pin_map.pptx
+++ b/img/pin_map.pptx
@@ -6,6 +6,7 @@
   </p:sldMasterIdLst>
   <p:sldIdLst>
     <p:sldId id="256" r:id="rId2"/>
+    <p:sldId id="257" r:id="rId3"/>
   </p:sldIdLst>
   <p:sldSz cx="12192000" cy="6858000"/>
   <p:notesSz cx="6858000" cy="9144000"/>
@@ -273,7 +274,7 @@
           <a:p>
             <a:fld id="{6BAEC7DB-416E-4648-AE31-15D6F0A9A9FB}" type="datetimeFigureOut">
               <a:rPr lang="en-US" smtClean="0"/>
-              <a:t>9/14/2018</a:t>
+              <a:t>9/20/2018</a:t>
             </a:fld>
             <a:endParaRPr lang="en-US"/>
           </a:p>
@@ -473,7 +474,7 @@
           <a:p>
             <a:fld id="{6BAEC7DB-416E-4648-AE31-15D6F0A9A9FB}" type="datetimeFigureOut">
               <a:rPr lang="en-US" smtClean="0"/>
-              <a:t>9/14/2018</a:t>
+              <a:t>9/20/2018</a:t>
             </a:fld>
             <a:endParaRPr lang="en-US"/>
           </a:p>
@@ -683,7 +684,7 @@
           <a:p>
             <a:fld id="{6BAEC7DB-416E-4648-AE31-15D6F0A9A9FB}" type="datetimeFigureOut">
               <a:rPr lang="en-US" smtClean="0"/>
-              <a:t>9/14/2018</a:t>
+              <a:t>9/20/2018</a:t>
             </a:fld>
             <a:endParaRPr lang="en-US"/>
           </a:p>
@@ -883,7 +884,7 @@
           <a:p>
             <a:fld id="{6BAEC7DB-416E-4648-AE31-15D6F0A9A9FB}" type="datetimeFigureOut">
               <a:rPr lang="en-US" smtClean="0"/>
-              <a:t>9/14/2018</a:t>
+              <a:t>9/20/2018</a:t>
             </a:fld>
             <a:endParaRPr lang="en-US"/>
           </a:p>
@@ -1159,7 +1160,7 @@
           <a:p>
             <a:fld id="{6BAEC7DB-416E-4648-AE31-15D6F0A9A9FB}" type="datetimeFigureOut">
               <a:rPr lang="en-US" smtClean="0"/>
-              <a:t>9/14/2018</a:t>
+              <a:t>9/20/2018</a:t>
             </a:fld>
             <a:endParaRPr lang="en-US"/>
           </a:p>
@@ -1427,7 +1428,7 @@
           <a:p>
             <a:fld id="{6BAEC7DB-416E-4648-AE31-15D6F0A9A9FB}" type="datetimeFigureOut">
               <a:rPr lang="en-US" smtClean="0"/>
-              <a:t>9/14/2018</a:t>
+              <a:t>9/20/2018</a:t>
             </a:fld>
             <a:endParaRPr lang="en-US"/>
           </a:p>
@@ -1842,7 +1843,7 @@
           <a:p>
             <a:fld id="{6BAEC7DB-416E-4648-AE31-15D6F0A9A9FB}" type="datetimeFigureOut">
               <a:rPr lang="en-US" smtClean="0"/>
-              <a:t>9/14/2018</a:t>
+              <a:t>9/20/2018</a:t>
             </a:fld>
             <a:endParaRPr lang="en-US"/>
           </a:p>
@@ -1984,7 +1985,7 @@
           <a:p>
             <a:fld id="{6BAEC7DB-416E-4648-AE31-15D6F0A9A9FB}" type="datetimeFigureOut">
               <a:rPr lang="en-US" smtClean="0"/>
-              <a:t>9/14/2018</a:t>
+              <a:t>9/20/2018</a:t>
             </a:fld>
             <a:endParaRPr lang="en-US"/>
           </a:p>
@@ -2097,7 +2098,7 @@
           <a:p>
             <a:fld id="{6BAEC7DB-416E-4648-AE31-15D6F0A9A9FB}" type="datetimeFigureOut">
               <a:rPr lang="en-US" smtClean="0"/>
-              <a:t>9/14/2018</a:t>
+              <a:t>9/20/2018</a:t>
             </a:fld>
             <a:endParaRPr lang="en-US"/>
           </a:p>
@@ -2410,7 +2411,7 @@
           <a:p>
             <a:fld id="{6BAEC7DB-416E-4648-AE31-15D6F0A9A9FB}" type="datetimeFigureOut">
               <a:rPr lang="en-US" smtClean="0"/>
-              <a:t>9/14/2018</a:t>
+              <a:t>9/20/2018</a:t>
             </a:fld>
             <a:endParaRPr lang="en-US"/>
           </a:p>
@@ -2699,7 +2700,7 @@
           <a:p>
             <a:fld id="{6BAEC7DB-416E-4648-AE31-15D6F0A9A9FB}" type="datetimeFigureOut">
               <a:rPr lang="en-US" smtClean="0"/>
-              <a:t>9/14/2018</a:t>
+              <a:t>9/20/2018</a:t>
             </a:fld>
             <a:endParaRPr lang="en-US"/>
           </a:p>
@@ -2942,7 +2943,7 @@
           <a:p>
             <a:fld id="{6BAEC7DB-416E-4648-AE31-15D6F0A9A9FB}" type="datetimeFigureOut">
               <a:rPr lang="en-US" smtClean="0"/>
-              <a:t>9/14/2018</a:t>
+              <a:t>9/20/2018</a:t>
             </a:fld>
             <a:endParaRPr lang="en-US"/>
           </a:p>
@@ -5315,6 +5316,2178 @@
 </p:sld>
 </file>
 
+<file path=ppt/slides/slide2.xml><?xml version="1.0" encoding="utf-8"?>
+<p:sld xmlns:a="http://schemas.openxmlformats.org/drawingml/2006/main" xmlns:r="http://schemas.openxmlformats.org/officeDocument/2006/relationships" xmlns:p="http://schemas.openxmlformats.org/presentationml/2006/main">
+  <p:cSld>
+    <p:spTree>
+      <p:nvGrpSpPr>
+        <p:cNvPr id="1" name=""/>
+        <p:cNvGrpSpPr/>
+        <p:nvPr/>
+      </p:nvGrpSpPr>
+      <p:grpSpPr>
+        <a:xfrm>
+          <a:off x="0" y="0"/>
+          <a:ext cx="0" cy="0"/>
+          <a:chOff x="0" y="0"/>
+          <a:chExt cx="0" cy="0"/>
+        </a:xfrm>
+      </p:grpSpPr>
+      <p:pic>
+        <p:nvPicPr>
+          <p:cNvPr id="4" name="图片 3">
+            <a:extLst>
+              <a:ext uri="{FF2B5EF4-FFF2-40B4-BE49-F238E27FC236}">
+                <a16:creationId xmlns:a16="http://schemas.microsoft.com/office/drawing/2014/main" id="{9A72E483-9C22-4601-A770-5A714CA1FABB}"/>
+              </a:ext>
+            </a:extLst>
+          </p:cNvPr>
+          <p:cNvPicPr>
+            <a:picLocks noChangeAspect="1"/>
+          </p:cNvPicPr>
+          <p:nvPr/>
+        </p:nvPicPr>
+        <p:blipFill>
+          <a:blip r:embed="rId2">
+            <a:extLst>
+              <a:ext uri="{28A0092B-C50C-407E-A947-70E740481C1C}">
+                <a14:useLocalDpi xmlns:a14="http://schemas.microsoft.com/office/drawing/2010/main" val="0"/>
+              </a:ext>
+            </a:extLst>
+          </a:blip>
+          <a:stretch>
+            <a:fillRect/>
+          </a:stretch>
+        </p:blipFill>
+        <p:spPr>
+          <a:xfrm>
+            <a:off x="3452279" y="59130"/>
+            <a:ext cx="5689600" cy="4267200"/>
+          </a:xfrm>
+          <a:prstGeom prst="rect">
+            <a:avLst/>
+          </a:prstGeom>
+        </p:spPr>
+      </p:pic>
+      <p:cxnSp>
+        <p:nvCxnSpPr>
+          <p:cNvPr id="59" name="直接连接符 58">
+            <a:extLst>
+              <a:ext uri="{FF2B5EF4-FFF2-40B4-BE49-F238E27FC236}">
+                <a16:creationId xmlns:a16="http://schemas.microsoft.com/office/drawing/2014/main" id="{554D8D14-D48D-45F6-89A6-634C964B8AE8}"/>
+              </a:ext>
+            </a:extLst>
+          </p:cNvPr>
+          <p:cNvCxnSpPr>
+            <a:cxnSpLocks/>
+          </p:cNvCxnSpPr>
+          <p:nvPr/>
+        </p:nvCxnSpPr>
+        <p:spPr>
+          <a:xfrm>
+            <a:off x="3578748" y="1794441"/>
+            <a:ext cx="1246435" cy="0"/>
+          </a:xfrm>
+          <a:prstGeom prst="line">
+            <a:avLst/>
+          </a:prstGeom>
+          <a:ln w="9525" cap="flat" cmpd="sng" algn="ctr">
+            <a:solidFill>
+              <a:schemeClr val="accent3"/>
+            </a:solidFill>
+            <a:prstDash val="dash"/>
+            <a:round/>
+            <a:headEnd type="none" w="med" len="med"/>
+            <a:tailEnd type="none" w="med" len="med"/>
+          </a:ln>
+        </p:spPr>
+        <p:style>
+          <a:lnRef idx="0">
+            <a:scrgbClr r="0" g="0" b="0"/>
+          </a:lnRef>
+          <a:fillRef idx="0">
+            <a:scrgbClr r="0" g="0" b="0"/>
+          </a:fillRef>
+          <a:effectRef idx="0">
+            <a:scrgbClr r="0" g="0" b="0"/>
+          </a:effectRef>
+          <a:fontRef idx="minor">
+            <a:schemeClr val="tx1"/>
+          </a:fontRef>
+        </p:style>
+      </p:cxnSp>
+      <p:cxnSp>
+        <p:nvCxnSpPr>
+          <p:cNvPr id="62" name="直接连接符 61">
+            <a:extLst>
+              <a:ext uri="{FF2B5EF4-FFF2-40B4-BE49-F238E27FC236}">
+                <a16:creationId xmlns:a16="http://schemas.microsoft.com/office/drawing/2014/main" id="{71513585-2402-4773-B202-B5A94B9B4E68}"/>
+              </a:ext>
+            </a:extLst>
+          </p:cNvPr>
+          <p:cNvCxnSpPr>
+            <a:cxnSpLocks/>
+          </p:cNvCxnSpPr>
+          <p:nvPr/>
+        </p:nvCxnSpPr>
+        <p:spPr>
+          <a:xfrm>
+            <a:off x="3578748" y="2495658"/>
+            <a:ext cx="1246435" cy="0"/>
+          </a:xfrm>
+          <a:prstGeom prst="line">
+            <a:avLst/>
+          </a:prstGeom>
+          <a:ln w="9525" cap="flat" cmpd="sng" algn="ctr">
+            <a:solidFill>
+              <a:schemeClr val="accent3"/>
+            </a:solidFill>
+            <a:prstDash val="dash"/>
+            <a:round/>
+            <a:headEnd type="none" w="med" len="med"/>
+            <a:tailEnd type="none" w="med" len="med"/>
+          </a:ln>
+        </p:spPr>
+        <p:style>
+          <a:lnRef idx="0">
+            <a:scrgbClr r="0" g="0" b="0"/>
+          </a:lnRef>
+          <a:fillRef idx="0">
+            <a:scrgbClr r="0" g="0" b="0"/>
+          </a:fillRef>
+          <a:effectRef idx="0">
+            <a:scrgbClr r="0" g="0" b="0"/>
+          </a:effectRef>
+          <a:fontRef idx="minor">
+            <a:schemeClr val="tx1"/>
+          </a:fontRef>
+        </p:style>
+      </p:cxnSp>
+      <p:cxnSp>
+        <p:nvCxnSpPr>
+          <p:cNvPr id="64" name="直接连接符 63">
+            <a:extLst>
+              <a:ext uri="{FF2B5EF4-FFF2-40B4-BE49-F238E27FC236}">
+                <a16:creationId xmlns:a16="http://schemas.microsoft.com/office/drawing/2014/main" id="{F11B205F-0707-4A55-ACA4-3B1022C2AD5E}"/>
+              </a:ext>
+            </a:extLst>
+          </p:cNvPr>
+          <p:cNvCxnSpPr>
+            <a:cxnSpLocks/>
+          </p:cNvCxnSpPr>
+          <p:nvPr/>
+        </p:nvCxnSpPr>
+        <p:spPr>
+          <a:xfrm flipV="1">
+            <a:off x="2888863" y="2264552"/>
+            <a:ext cx="1958683" cy="0"/>
+          </a:xfrm>
+          <a:prstGeom prst="line">
+            <a:avLst/>
+          </a:prstGeom>
+          <a:ln w="9525" cap="flat" cmpd="sng" algn="ctr">
+            <a:solidFill>
+              <a:schemeClr val="accent3"/>
+            </a:solidFill>
+            <a:prstDash val="dash"/>
+            <a:round/>
+            <a:headEnd type="none" w="med" len="med"/>
+            <a:tailEnd type="none" w="med" len="med"/>
+          </a:ln>
+        </p:spPr>
+        <p:style>
+          <a:lnRef idx="0">
+            <a:scrgbClr r="0" g="0" b="0"/>
+          </a:lnRef>
+          <a:fillRef idx="0">
+            <a:scrgbClr r="0" g="0" b="0"/>
+          </a:fillRef>
+          <a:effectRef idx="0">
+            <a:scrgbClr r="0" g="0" b="0"/>
+          </a:effectRef>
+          <a:fontRef idx="minor">
+            <a:schemeClr val="tx1"/>
+          </a:fontRef>
+        </p:style>
+      </p:cxnSp>
+      <p:cxnSp>
+        <p:nvCxnSpPr>
+          <p:cNvPr id="69" name="直接连接符 68">
+            <a:extLst>
+              <a:ext uri="{FF2B5EF4-FFF2-40B4-BE49-F238E27FC236}">
+                <a16:creationId xmlns:a16="http://schemas.microsoft.com/office/drawing/2014/main" id="{C23963EC-181B-4C8C-91B5-30994438B94F}"/>
+              </a:ext>
+            </a:extLst>
+          </p:cNvPr>
+          <p:cNvCxnSpPr>
+            <a:cxnSpLocks/>
+          </p:cNvCxnSpPr>
+          <p:nvPr/>
+        </p:nvCxnSpPr>
+        <p:spPr>
+          <a:xfrm>
+            <a:off x="2898136" y="2022807"/>
+            <a:ext cx="1958683" cy="0"/>
+          </a:xfrm>
+          <a:prstGeom prst="line">
+            <a:avLst/>
+          </a:prstGeom>
+          <a:ln w="9525" cap="flat" cmpd="sng" algn="ctr">
+            <a:solidFill>
+              <a:schemeClr val="accent3"/>
+            </a:solidFill>
+            <a:prstDash val="dash"/>
+            <a:round/>
+            <a:headEnd type="none" w="med" len="med"/>
+            <a:tailEnd type="none" w="med" len="med"/>
+          </a:ln>
+        </p:spPr>
+        <p:style>
+          <a:lnRef idx="0">
+            <a:scrgbClr r="0" g="0" b="0"/>
+          </a:lnRef>
+          <a:fillRef idx="0">
+            <a:scrgbClr r="0" g="0" b="0"/>
+          </a:fillRef>
+          <a:effectRef idx="0">
+            <a:scrgbClr r="0" g="0" b="0"/>
+          </a:effectRef>
+          <a:fontRef idx="minor">
+            <a:schemeClr val="tx1"/>
+          </a:fontRef>
+        </p:style>
+      </p:cxnSp>
+      <p:cxnSp>
+        <p:nvCxnSpPr>
+          <p:cNvPr id="83" name="直接连接符 82">
+            <a:extLst>
+              <a:ext uri="{FF2B5EF4-FFF2-40B4-BE49-F238E27FC236}">
+                <a16:creationId xmlns:a16="http://schemas.microsoft.com/office/drawing/2014/main" id="{2B1DA2A3-4ED3-4440-94B7-BBD22FB36479}"/>
+              </a:ext>
+            </a:extLst>
+          </p:cNvPr>
+          <p:cNvCxnSpPr>
+            <a:cxnSpLocks/>
+          </p:cNvCxnSpPr>
+          <p:nvPr/>
+        </p:nvCxnSpPr>
+        <p:spPr>
+          <a:xfrm flipH="1" flipV="1">
+            <a:off x="2894339" y="1556516"/>
+            <a:ext cx="684409" cy="237924"/>
+          </a:xfrm>
+          <a:prstGeom prst="line">
+            <a:avLst/>
+          </a:prstGeom>
+          <a:ln w="9525" cap="flat" cmpd="sng" algn="ctr">
+            <a:solidFill>
+              <a:schemeClr val="accent3"/>
+            </a:solidFill>
+            <a:prstDash val="dash"/>
+            <a:round/>
+            <a:headEnd type="none" w="med" len="med"/>
+            <a:tailEnd type="none" w="med" len="med"/>
+          </a:ln>
+        </p:spPr>
+        <p:style>
+          <a:lnRef idx="0">
+            <a:scrgbClr r="0" g="0" b="0"/>
+          </a:lnRef>
+          <a:fillRef idx="0">
+            <a:scrgbClr r="0" g="0" b="0"/>
+          </a:fillRef>
+          <a:effectRef idx="0">
+            <a:scrgbClr r="0" g="0" b="0"/>
+          </a:effectRef>
+          <a:fontRef idx="minor">
+            <a:schemeClr val="tx1"/>
+          </a:fontRef>
+        </p:style>
+      </p:cxnSp>
+      <p:cxnSp>
+        <p:nvCxnSpPr>
+          <p:cNvPr id="86" name="直接连接符 85">
+            <a:extLst>
+              <a:ext uri="{FF2B5EF4-FFF2-40B4-BE49-F238E27FC236}">
+                <a16:creationId xmlns:a16="http://schemas.microsoft.com/office/drawing/2014/main" id="{1DDB23F1-BC13-4F76-9BE4-AB93E1600A98}"/>
+              </a:ext>
+            </a:extLst>
+          </p:cNvPr>
+          <p:cNvCxnSpPr>
+            <a:cxnSpLocks/>
+          </p:cNvCxnSpPr>
+          <p:nvPr/>
+        </p:nvCxnSpPr>
+        <p:spPr>
+          <a:xfrm flipH="1">
+            <a:off x="2894339" y="2495658"/>
+            <a:ext cx="684409" cy="234636"/>
+          </a:xfrm>
+          <a:prstGeom prst="line">
+            <a:avLst/>
+          </a:prstGeom>
+          <a:ln w="9525" cap="flat" cmpd="sng" algn="ctr">
+            <a:solidFill>
+              <a:schemeClr val="accent3"/>
+            </a:solidFill>
+            <a:prstDash val="dash"/>
+            <a:round/>
+            <a:headEnd type="none" w="med" len="med"/>
+            <a:tailEnd type="none" w="med" len="med"/>
+          </a:ln>
+        </p:spPr>
+        <p:style>
+          <a:lnRef idx="0">
+            <a:scrgbClr r="0" g="0" b="0"/>
+          </a:lnRef>
+          <a:fillRef idx="0">
+            <a:scrgbClr r="0" g="0" b="0"/>
+          </a:fillRef>
+          <a:effectRef idx="0">
+            <a:scrgbClr r="0" g="0" b="0"/>
+          </a:effectRef>
+          <a:fontRef idx="minor">
+            <a:schemeClr val="tx1"/>
+          </a:fontRef>
+        </p:style>
+      </p:cxnSp>
+      <p:sp>
+        <p:nvSpPr>
+          <p:cNvPr id="5" name="文本框 4">
+            <a:extLst>
+              <a:ext uri="{FF2B5EF4-FFF2-40B4-BE49-F238E27FC236}">
+                <a16:creationId xmlns:a16="http://schemas.microsoft.com/office/drawing/2014/main" id="{D01C0A0C-C039-423C-A515-A9BDBADCF5E6}"/>
+              </a:ext>
+            </a:extLst>
+          </p:cNvPr>
+          <p:cNvSpPr txBox="1"/>
+          <p:nvPr/>
+        </p:nvSpPr>
+        <p:spPr>
+          <a:xfrm>
+            <a:off x="1603659" y="4057801"/>
+            <a:ext cx="4995411" cy="2072362"/>
+          </a:xfrm>
+          <a:prstGeom prst="rect">
+            <a:avLst/>
+          </a:prstGeom>
+          <a:noFill/>
+        </p:spPr>
+        <p:txBody>
+          <a:bodyPr wrap="square" rtlCol="0">
+            <a:spAutoFit/>
+          </a:bodyPr>
+          <a:lstStyle/>
+          <a:p>
+            <a:pPr>
+              <a:lnSpc>
+                <a:spcPts val="2600"/>
+              </a:lnSpc>
+            </a:pPr>
+            <a:r>
+              <a:rPr lang="en-US" sz="1600" b="1">
+                <a:latin typeface="Leelawadee UI" panose="020B0502040204020203" pitchFamily="34" charset="-34"/>
+                <a:ea typeface="Microsoft JhengHei Light" panose="020B0304030504040204" pitchFamily="34" charset="-120"/>
+                <a:cs typeface="Leelawadee UI" panose="020B0502040204020203" pitchFamily="34" charset="-34"/>
+              </a:rPr>
+              <a:t>GND</a:t>
+            </a:r>
+            <a:r>
+              <a:rPr lang="en-US" sz="1600">
+                <a:latin typeface="Leelawadee UI" panose="020B0502040204020203" pitchFamily="34" charset="-34"/>
+                <a:ea typeface="Microsoft JhengHei Light" panose="020B0304030504040204" pitchFamily="34" charset="-120"/>
+                <a:cs typeface="Leelawadee UI" panose="020B0502040204020203" pitchFamily="34" charset="-34"/>
+              </a:rPr>
+              <a:t>: </a:t>
+            </a:r>
+            <a:r>
+              <a:rPr lang="zh-CN" altLang="en-US" sz="1600">
+                <a:latin typeface="华文楷体" panose="02010600040101010101" pitchFamily="2" charset="-122"/>
+                <a:ea typeface="华文楷体" panose="02010600040101010101" pitchFamily="2" charset="-122"/>
+                <a:cs typeface="Leelawadee UI" panose="020B0502040204020203" pitchFamily="34" charset="-34"/>
+              </a:rPr>
+              <a:t>将此模块连接到系统 </a:t>
+            </a:r>
+            <a:r>
+              <a:rPr lang="en-US" sz="1600">
+                <a:latin typeface="华文楷体" panose="02010600040101010101" pitchFamily="2" charset="-122"/>
+                <a:ea typeface="华文楷体" panose="02010600040101010101" pitchFamily="2" charset="-122"/>
+                <a:cs typeface="Leelawadee UI" panose="020B0502040204020203" pitchFamily="34" charset="-34"/>
+              </a:rPr>
+              <a:t>GND </a:t>
+            </a:r>
+            <a:r>
+              <a:rPr lang="zh-CN" altLang="en-US" sz="1600">
+                <a:latin typeface="华文楷体" panose="02010600040101010101" pitchFamily="2" charset="-122"/>
+                <a:ea typeface="华文楷体" panose="02010600040101010101" pitchFamily="2" charset="-122"/>
+                <a:cs typeface="Leelawadee UI" panose="020B0502040204020203" pitchFamily="34" charset="-34"/>
+              </a:rPr>
+              <a:t>上</a:t>
+            </a:r>
+            <a:endParaRPr lang="en-US" sz="1600">
+              <a:latin typeface="华文楷体" panose="02010600040101010101" pitchFamily="2" charset="-122"/>
+              <a:ea typeface="华文楷体" panose="02010600040101010101" pitchFamily="2" charset="-122"/>
+              <a:cs typeface="Leelawadee UI" panose="020B0502040204020203" pitchFamily="34" charset="-34"/>
+            </a:endParaRPr>
+          </a:p>
+          <a:p>
+            <a:pPr>
+              <a:lnSpc>
+                <a:spcPts val="2600"/>
+              </a:lnSpc>
+            </a:pPr>
+            <a:r>
+              <a:rPr lang="en-US" sz="1600" b="1">
+                <a:latin typeface="Leelawadee UI" panose="020B0502040204020203" pitchFamily="34" charset="-34"/>
+                <a:ea typeface="Microsoft JhengHei Light" panose="020B0304030504040204" pitchFamily="34" charset="-120"/>
+                <a:cs typeface="Leelawadee UI" panose="020B0502040204020203" pitchFamily="34" charset="-34"/>
+              </a:rPr>
+              <a:t>VCC</a:t>
+            </a:r>
+            <a:r>
+              <a:rPr lang="en-US" sz="1600">
+                <a:latin typeface="Leelawadee UI" panose="020B0502040204020203" pitchFamily="34" charset="-34"/>
+                <a:ea typeface="Microsoft JhengHei Light" panose="020B0304030504040204" pitchFamily="34" charset="-120"/>
+                <a:cs typeface="Leelawadee UI" panose="020B0502040204020203" pitchFamily="34" charset="-34"/>
+              </a:rPr>
+              <a:t>: </a:t>
+            </a:r>
+            <a:r>
+              <a:rPr lang="zh-CN" altLang="en-US" sz="1600">
+                <a:latin typeface="华文楷体" panose="02010600040101010101" pitchFamily="2" charset="-122"/>
+                <a:ea typeface="华文楷体" panose="02010600040101010101" pitchFamily="2" charset="-122"/>
+                <a:cs typeface="Leelawadee UI" panose="020B0502040204020203" pitchFamily="34" charset="-34"/>
+              </a:rPr>
+              <a:t>此模块中您可使用 </a:t>
+            </a:r>
+            <a:r>
+              <a:rPr lang="en-US" sz="1600">
+                <a:latin typeface="华文楷体" panose="02010600040101010101" pitchFamily="2" charset="-122"/>
+                <a:ea typeface="华文楷体" panose="02010600040101010101" pitchFamily="2" charset="-122"/>
+                <a:cs typeface="Leelawadee UI" panose="020B0502040204020203" pitchFamily="34" charset="-34"/>
+              </a:rPr>
+              <a:t>5V </a:t>
+            </a:r>
+            <a:r>
+              <a:rPr lang="zh-CN" altLang="en-US" sz="1600">
+                <a:latin typeface="华文楷体" panose="02010600040101010101" pitchFamily="2" charset="-122"/>
+                <a:ea typeface="华文楷体" panose="02010600040101010101" pitchFamily="2" charset="-122"/>
+                <a:cs typeface="Leelawadee UI" panose="020B0502040204020203" pitchFamily="34" charset="-34"/>
+              </a:rPr>
+              <a:t>或</a:t>
+            </a:r>
+            <a:r>
+              <a:rPr lang="en-US" sz="1600">
+                <a:latin typeface="华文楷体" panose="02010600040101010101" pitchFamily="2" charset="-122"/>
+                <a:ea typeface="华文楷体" panose="02010600040101010101" pitchFamily="2" charset="-122"/>
+                <a:cs typeface="Leelawadee UI" panose="020B0502040204020203" pitchFamily="34" charset="-34"/>
+              </a:rPr>
+              <a:t> 3.3V </a:t>
+            </a:r>
+            <a:r>
+              <a:rPr lang="zh-CN" altLang="en-US" sz="1600">
+                <a:latin typeface="华文楷体" panose="02010600040101010101" pitchFamily="2" charset="-122"/>
+                <a:ea typeface="华文楷体" panose="02010600040101010101" pitchFamily="2" charset="-122"/>
+                <a:cs typeface="Leelawadee UI" panose="020B0502040204020203" pitchFamily="34" charset="-34"/>
+              </a:rPr>
+              <a:t>电压</a:t>
+            </a:r>
+            <a:endParaRPr lang="en-US" sz="1600">
+              <a:latin typeface="华文楷体" panose="02010600040101010101" pitchFamily="2" charset="-122"/>
+              <a:ea typeface="华文楷体" panose="02010600040101010101" pitchFamily="2" charset="-122"/>
+              <a:cs typeface="Leelawadee UI" panose="020B0502040204020203" pitchFamily="34" charset="-34"/>
+            </a:endParaRPr>
+          </a:p>
+          <a:p>
+            <a:pPr>
+              <a:lnSpc>
+                <a:spcPts val="2600"/>
+              </a:lnSpc>
+            </a:pPr>
+            <a:r>
+              <a:rPr lang="en-US" sz="1600" b="1">
+                <a:latin typeface="Leelawadee UI" panose="020B0502040204020203" pitchFamily="34" charset="-34"/>
+                <a:ea typeface="Microsoft JhengHei Light" panose="020B0304030504040204" pitchFamily="34" charset="-120"/>
+                <a:cs typeface="Leelawadee UI" panose="020B0502040204020203" pitchFamily="34" charset="-34"/>
+              </a:rPr>
+              <a:t>NC</a:t>
+            </a:r>
+            <a:r>
+              <a:rPr lang="en-US" sz="1600">
+                <a:latin typeface="Leelawadee UI" panose="020B0502040204020203" pitchFamily="34" charset="-34"/>
+                <a:ea typeface="Microsoft JhengHei Light" panose="020B0304030504040204" pitchFamily="34" charset="-120"/>
+                <a:cs typeface="Leelawadee UI" panose="020B0502040204020203" pitchFamily="34" charset="-34"/>
+              </a:rPr>
+              <a:t>: </a:t>
+            </a:r>
+            <a:r>
+              <a:rPr lang="zh-CN" altLang="en-US" sz="1600">
+                <a:latin typeface="华文楷体" panose="02010600040101010101" pitchFamily="2" charset="-122"/>
+                <a:ea typeface="华文楷体" panose="02010600040101010101" pitchFamily="2" charset="-122"/>
+                <a:cs typeface="Leelawadee UI" panose="020B0502040204020203" pitchFamily="34" charset="-34"/>
+              </a:rPr>
+              <a:t>此模块中不连接</a:t>
+            </a:r>
+            <a:endParaRPr lang="en-US" sz="1600">
+              <a:latin typeface="华文楷体" panose="02010600040101010101" pitchFamily="2" charset="-122"/>
+              <a:ea typeface="华文楷体" panose="02010600040101010101" pitchFamily="2" charset="-122"/>
+              <a:cs typeface="Leelawadee UI" panose="020B0502040204020203" pitchFamily="34" charset="-34"/>
+            </a:endParaRPr>
+          </a:p>
+          <a:p>
+            <a:pPr>
+              <a:lnSpc>
+                <a:spcPts val="2600"/>
+              </a:lnSpc>
+            </a:pPr>
+            <a:r>
+              <a:rPr lang="en-US" sz="1600" b="1">
+                <a:latin typeface="Leelawadee UI" panose="020B0502040204020203" pitchFamily="34" charset="-34"/>
+                <a:ea typeface="Microsoft JhengHei Light" panose="020B0304030504040204" pitchFamily="34" charset="-120"/>
+                <a:cs typeface="Leelawadee UI" panose="020B0502040204020203" pitchFamily="34" charset="-34"/>
+              </a:rPr>
+              <a:t>SIG</a:t>
+            </a:r>
+            <a:r>
+              <a:rPr lang="en-US" sz="1600">
+                <a:latin typeface="Leelawadee UI" panose="020B0502040204020203" pitchFamily="34" charset="-34"/>
+                <a:ea typeface="Microsoft JhengHei Light" panose="020B0304030504040204" pitchFamily="34" charset="-120"/>
+                <a:cs typeface="Leelawadee UI" panose="020B0502040204020203" pitchFamily="34" charset="-34"/>
+              </a:rPr>
+              <a:t>: </a:t>
+            </a:r>
+            <a:r>
+              <a:rPr lang="zh-CN" altLang="en-US" sz="1600">
+                <a:latin typeface="华文楷体" panose="02010600040101010101" pitchFamily="2" charset="-122"/>
+                <a:ea typeface="华文楷体" panose="02010600040101010101" pitchFamily="2" charset="-122"/>
+                <a:cs typeface="Leelawadee UI" panose="020B0502040204020203" pitchFamily="34" charset="-34"/>
+              </a:rPr>
+              <a:t>输出 </a:t>
+            </a:r>
+            <a:r>
+              <a:rPr lang="en-US" sz="1600" err="1">
+                <a:latin typeface="华文楷体" panose="02010600040101010101" pitchFamily="2" charset="-122"/>
+                <a:ea typeface="华文楷体" panose="02010600040101010101" pitchFamily="2" charset="-122"/>
+                <a:cs typeface="Leelawadee UI" panose="020B0502040204020203" pitchFamily="34" charset="-34"/>
+              </a:rPr>
+              <a:t>Vout</a:t>
+            </a:r>
+            <a:r>
+              <a:rPr lang="en-US" sz="1600">
+                <a:latin typeface="华文楷体" panose="02010600040101010101" pitchFamily="2" charset="-122"/>
+                <a:ea typeface="华文楷体" panose="02010600040101010101" pitchFamily="2" charset="-122"/>
+                <a:cs typeface="Leelawadee UI" panose="020B0502040204020203" pitchFamily="34" charset="-34"/>
+              </a:rPr>
+              <a:t> </a:t>
+            </a:r>
+            <a:r>
+              <a:rPr lang="zh-CN" altLang="en-US" sz="1600">
+                <a:latin typeface="华文楷体" panose="02010600040101010101" pitchFamily="2" charset="-122"/>
+                <a:ea typeface="华文楷体" panose="02010600040101010101" pitchFamily="2" charset="-122"/>
+                <a:cs typeface="Leelawadee UI" panose="020B0502040204020203" pitchFamily="34" charset="-34"/>
+              </a:rPr>
+              <a:t>电压信号</a:t>
+            </a:r>
+            <a:endParaRPr lang="en-US" sz="1200">
+              <a:solidFill>
+                <a:srgbClr val="D4D4D4"/>
+              </a:solidFill>
+              <a:latin typeface="华文楷体" panose="02010600040101010101" pitchFamily="2" charset="-122"/>
+              <a:ea typeface="华文楷体" panose="02010600040101010101" pitchFamily="2" charset="-122"/>
+            </a:endParaRPr>
+          </a:p>
+          <a:p>
+            <a:endParaRPr lang="en-US" sz="1200">
+              <a:latin typeface="Times New Roman" panose="02020603050405020304" pitchFamily="18" charset="0"/>
+              <a:cs typeface="Times New Roman" panose="02020603050405020304" pitchFamily="18" charset="0"/>
+            </a:endParaRPr>
+          </a:p>
+          <a:p>
+            <a:endParaRPr lang="en-US" sz="1200">
+              <a:latin typeface="Times New Roman" panose="02020603050405020304" pitchFamily="18" charset="0"/>
+              <a:cs typeface="Times New Roman" panose="02020603050405020304" pitchFamily="18" charset="0"/>
+            </a:endParaRPr>
+          </a:p>
+          <a:p>
+            <a:endParaRPr lang="en-US"/>
+          </a:p>
+        </p:txBody>
+      </p:sp>
+      <p:pic>
+        <p:nvPicPr>
+          <p:cNvPr id="22" name="图片 21">
+            <a:extLst>
+              <a:ext uri="{FF2B5EF4-FFF2-40B4-BE49-F238E27FC236}">
+                <a16:creationId xmlns:a16="http://schemas.microsoft.com/office/drawing/2014/main" id="{A6958E65-9292-4269-8906-BB52EB9B73FA}"/>
+              </a:ext>
+            </a:extLst>
+          </p:cNvPr>
+          <p:cNvPicPr>
+            <a:picLocks noChangeAspect="1"/>
+          </p:cNvPicPr>
+          <p:nvPr/>
+        </p:nvPicPr>
+        <p:blipFill>
+          <a:blip r:embed="rId3">
+            <a:extLst>
+              <a:ext uri="{28A0092B-C50C-407E-A947-70E740481C1C}">
+                <a14:useLocalDpi xmlns:a14="http://schemas.microsoft.com/office/drawing/2010/main" val="0"/>
+              </a:ext>
+            </a:extLst>
+          </a:blip>
+          <a:stretch>
+            <a:fillRect/>
+          </a:stretch>
+        </p:blipFill>
+        <p:spPr>
+          <a:xfrm>
+            <a:off x="8552254" y="405388"/>
+            <a:ext cx="472059" cy="472059"/>
+          </a:xfrm>
+          <a:prstGeom prst="rect">
+            <a:avLst/>
+          </a:prstGeom>
+        </p:spPr>
+      </p:pic>
+      <p:pic>
+        <p:nvPicPr>
+          <p:cNvPr id="23" name="图片 22">
+            <a:extLst>
+              <a:ext uri="{FF2B5EF4-FFF2-40B4-BE49-F238E27FC236}">
+                <a16:creationId xmlns:a16="http://schemas.microsoft.com/office/drawing/2014/main" id="{2A1EB678-2A0E-4D81-9C77-85F3C5046B71}"/>
+              </a:ext>
+            </a:extLst>
+          </p:cNvPr>
+          <p:cNvPicPr>
+            <a:picLocks noChangeAspect="1"/>
+          </p:cNvPicPr>
+          <p:nvPr/>
+        </p:nvPicPr>
+        <p:blipFill>
+          <a:blip r:embed="rId4">
+            <a:extLst>
+              <a:ext uri="{28A0092B-C50C-407E-A947-70E740481C1C}">
+                <a14:useLocalDpi xmlns:a14="http://schemas.microsoft.com/office/drawing/2010/main" val="0"/>
+              </a:ext>
+            </a:extLst>
+          </a:blip>
+          <a:stretch>
+            <a:fillRect/>
+          </a:stretch>
+        </p:blipFill>
+        <p:spPr>
+          <a:xfrm>
+            <a:off x="5917598" y="3617691"/>
+            <a:ext cx="472059" cy="472059"/>
+          </a:xfrm>
+          <a:prstGeom prst="rect">
+            <a:avLst/>
+          </a:prstGeom>
+        </p:spPr>
+      </p:pic>
+      <p:pic>
+        <p:nvPicPr>
+          <p:cNvPr id="24" name="图片 23">
+            <a:extLst>
+              <a:ext uri="{FF2B5EF4-FFF2-40B4-BE49-F238E27FC236}">
+                <a16:creationId xmlns:a16="http://schemas.microsoft.com/office/drawing/2014/main" id="{6FC288AB-2E77-4BF6-8EC8-F6B8BE5B1782}"/>
+              </a:ext>
+            </a:extLst>
+          </p:cNvPr>
+          <p:cNvPicPr>
+            <a:picLocks noChangeAspect="1"/>
+          </p:cNvPicPr>
+          <p:nvPr/>
+        </p:nvPicPr>
+        <p:blipFill>
+          <a:blip r:embed="rId5">
+            <a:extLst>
+              <a:ext uri="{28A0092B-C50C-407E-A947-70E740481C1C}">
+                <a14:useLocalDpi xmlns:a14="http://schemas.microsoft.com/office/drawing/2010/main" val="0"/>
+              </a:ext>
+            </a:extLst>
+          </a:blip>
+          <a:stretch>
+            <a:fillRect/>
+          </a:stretch>
+        </p:blipFill>
+        <p:spPr>
+          <a:xfrm>
+            <a:off x="6126862" y="304934"/>
+            <a:ext cx="472059" cy="472059"/>
+          </a:xfrm>
+          <a:prstGeom prst="rect">
+            <a:avLst/>
+          </a:prstGeom>
+        </p:spPr>
+      </p:pic>
+      <p:pic>
+        <p:nvPicPr>
+          <p:cNvPr id="29" name="图片 28">
+            <a:extLst>
+              <a:ext uri="{FF2B5EF4-FFF2-40B4-BE49-F238E27FC236}">
+                <a16:creationId xmlns:a16="http://schemas.microsoft.com/office/drawing/2014/main" id="{0459E7EB-C377-43C6-AAFB-A5B220D45F01}"/>
+              </a:ext>
+            </a:extLst>
+          </p:cNvPr>
+          <p:cNvPicPr>
+            <a:picLocks noChangeAspect="1"/>
+          </p:cNvPicPr>
+          <p:nvPr/>
+        </p:nvPicPr>
+        <p:blipFill>
+          <a:blip r:embed="rId6">
+            <a:extLst>
+              <a:ext uri="{28A0092B-C50C-407E-A947-70E740481C1C}">
+                <a14:useLocalDpi xmlns:a14="http://schemas.microsoft.com/office/drawing/2010/main" val="0"/>
+              </a:ext>
+            </a:extLst>
+          </a:blip>
+          <a:stretch>
+            <a:fillRect/>
+          </a:stretch>
+        </p:blipFill>
+        <p:spPr>
+          <a:xfrm>
+            <a:off x="6357851" y="3621381"/>
+            <a:ext cx="472059" cy="472059"/>
+          </a:xfrm>
+          <a:prstGeom prst="rect">
+            <a:avLst/>
+          </a:prstGeom>
+        </p:spPr>
+      </p:pic>
+      <p:cxnSp>
+        <p:nvCxnSpPr>
+          <p:cNvPr id="7" name="直接连接符 6">
+            <a:extLst>
+              <a:ext uri="{FF2B5EF4-FFF2-40B4-BE49-F238E27FC236}">
+                <a16:creationId xmlns:a16="http://schemas.microsoft.com/office/drawing/2014/main" id="{EF11B499-9500-4EF5-93E5-4DBDC261FDE4}"/>
+              </a:ext>
+            </a:extLst>
+          </p:cNvPr>
+          <p:cNvCxnSpPr>
+            <a:cxnSpLocks/>
+          </p:cNvCxnSpPr>
+          <p:nvPr/>
+        </p:nvCxnSpPr>
+        <p:spPr>
+          <a:xfrm>
+            <a:off x="6156964" y="2528513"/>
+            <a:ext cx="0" cy="1147562"/>
+          </a:xfrm>
+          <a:prstGeom prst="line">
+            <a:avLst/>
+          </a:prstGeom>
+          <a:ln w="15875" cap="flat" cmpd="sng" algn="ctr">
+            <a:solidFill>
+              <a:schemeClr val="bg1">
+                <a:lumMod val="85000"/>
+              </a:schemeClr>
+            </a:solidFill>
+            <a:prstDash val="dash"/>
+            <a:round/>
+            <a:headEnd type="none" w="med" len="med"/>
+            <a:tailEnd type="none" w="med" len="med"/>
+          </a:ln>
+        </p:spPr>
+        <p:style>
+          <a:lnRef idx="0">
+            <a:scrgbClr r="0" g="0" b="0"/>
+          </a:lnRef>
+          <a:fillRef idx="0">
+            <a:scrgbClr r="0" g="0" b="0"/>
+          </a:fillRef>
+          <a:effectRef idx="0">
+            <a:scrgbClr r="0" g="0" b="0"/>
+          </a:effectRef>
+          <a:fontRef idx="minor">
+            <a:schemeClr val="tx1"/>
+          </a:fontRef>
+        </p:style>
+      </p:cxnSp>
+      <p:cxnSp>
+        <p:nvCxnSpPr>
+          <p:cNvPr id="34" name="直接连接符 33">
+            <a:extLst>
+              <a:ext uri="{FF2B5EF4-FFF2-40B4-BE49-F238E27FC236}">
+                <a16:creationId xmlns:a16="http://schemas.microsoft.com/office/drawing/2014/main" id="{21C41BEC-2089-4C7D-8C10-6170C12C96F6}"/>
+              </a:ext>
+            </a:extLst>
+          </p:cNvPr>
+          <p:cNvCxnSpPr>
+            <a:cxnSpLocks/>
+          </p:cNvCxnSpPr>
+          <p:nvPr/>
+        </p:nvCxnSpPr>
+        <p:spPr>
+          <a:xfrm>
+            <a:off x="6558743" y="2537749"/>
+            <a:ext cx="0" cy="1138326"/>
+          </a:xfrm>
+          <a:prstGeom prst="line">
+            <a:avLst/>
+          </a:prstGeom>
+          <a:ln w="15875" cap="flat" cmpd="sng" algn="ctr">
+            <a:solidFill>
+              <a:schemeClr val="bg1">
+                <a:lumMod val="85000"/>
+              </a:schemeClr>
+            </a:solidFill>
+            <a:prstDash val="dash"/>
+            <a:round/>
+            <a:headEnd type="none" w="med" len="med"/>
+            <a:tailEnd type="none" w="med" len="med"/>
+          </a:ln>
+        </p:spPr>
+        <p:style>
+          <a:lnRef idx="0">
+            <a:scrgbClr r="0" g="0" b="0"/>
+          </a:lnRef>
+          <a:fillRef idx="0">
+            <a:scrgbClr r="0" g="0" b="0"/>
+          </a:fillRef>
+          <a:effectRef idx="0">
+            <a:scrgbClr r="0" g="0" b="0"/>
+          </a:effectRef>
+          <a:fontRef idx="minor">
+            <a:schemeClr val="tx1"/>
+          </a:fontRef>
+        </p:style>
+      </p:cxnSp>
+      <p:cxnSp>
+        <p:nvCxnSpPr>
+          <p:cNvPr id="35" name="直接连接符 34">
+            <a:extLst>
+              <a:ext uri="{FF2B5EF4-FFF2-40B4-BE49-F238E27FC236}">
+                <a16:creationId xmlns:a16="http://schemas.microsoft.com/office/drawing/2014/main" id="{B7CC3042-034A-4932-A6AF-85FB7BE51F91}"/>
+              </a:ext>
+            </a:extLst>
+          </p:cNvPr>
+          <p:cNvCxnSpPr>
+            <a:cxnSpLocks/>
+          </p:cNvCxnSpPr>
+          <p:nvPr/>
+        </p:nvCxnSpPr>
+        <p:spPr>
+          <a:xfrm>
+            <a:off x="6357853" y="748148"/>
+            <a:ext cx="0" cy="1389106"/>
+          </a:xfrm>
+          <a:prstGeom prst="line">
+            <a:avLst/>
+          </a:prstGeom>
+          <a:ln w="15875" cap="flat" cmpd="sng" algn="ctr">
+            <a:solidFill>
+              <a:schemeClr val="bg1">
+                <a:lumMod val="85000"/>
+              </a:schemeClr>
+            </a:solidFill>
+            <a:prstDash val="dash"/>
+            <a:round/>
+            <a:headEnd type="none" w="med" len="med"/>
+            <a:tailEnd type="none" w="med" len="med"/>
+          </a:ln>
+        </p:spPr>
+        <p:style>
+          <a:lnRef idx="0">
+            <a:scrgbClr r="0" g="0" b="0"/>
+          </a:lnRef>
+          <a:fillRef idx="0">
+            <a:scrgbClr r="0" g="0" b="0"/>
+          </a:fillRef>
+          <a:effectRef idx="0">
+            <a:scrgbClr r="0" g="0" b="0"/>
+          </a:effectRef>
+          <a:fontRef idx="minor">
+            <a:schemeClr val="tx1"/>
+          </a:fontRef>
+        </p:style>
+      </p:cxnSp>
+      <p:sp>
+        <p:nvSpPr>
+          <p:cNvPr id="38" name="椭圆 37">
+            <a:extLst>
+              <a:ext uri="{FF2B5EF4-FFF2-40B4-BE49-F238E27FC236}">
+                <a16:creationId xmlns:a16="http://schemas.microsoft.com/office/drawing/2014/main" id="{08D13224-C2AD-4270-B9B1-149D886D4CF2}"/>
+              </a:ext>
+            </a:extLst>
+          </p:cNvPr>
+          <p:cNvSpPr>
+            <a:spLocks noChangeAspect="1"/>
+          </p:cNvSpPr>
+          <p:nvPr/>
+        </p:nvSpPr>
+        <p:spPr>
+          <a:xfrm>
+            <a:off x="6306290" y="1971245"/>
+            <a:ext cx="103124" cy="103124"/>
+          </a:xfrm>
+          <a:prstGeom prst="ellipse">
+            <a:avLst/>
+          </a:prstGeom>
+          <a:solidFill>
+            <a:srgbClr val="FFC000"/>
+          </a:solidFill>
+          <a:ln w="22225">
+            <a:solidFill>
+              <a:srgbClr val="FFFFFF"/>
+            </a:solidFill>
+          </a:ln>
+        </p:spPr>
+        <p:style>
+          <a:lnRef idx="2">
+            <a:schemeClr val="accent1">
+              <a:shade val="50000"/>
+            </a:schemeClr>
+          </a:lnRef>
+          <a:fillRef idx="1">
+            <a:schemeClr val="accent1"/>
+          </a:fillRef>
+          <a:effectRef idx="0">
+            <a:schemeClr val="accent1"/>
+          </a:effectRef>
+          <a:fontRef idx="minor">
+            <a:schemeClr val="lt1"/>
+          </a:fontRef>
+        </p:style>
+        <p:txBody>
+          <a:bodyPr rtlCol="0" anchor="ctr"/>
+          <a:lstStyle/>
+          <a:p>
+            <a:pPr algn="ctr"/>
+            <a:endParaRPr lang="en-US"/>
+          </a:p>
+        </p:txBody>
+      </p:sp>
+      <p:sp>
+        <p:nvSpPr>
+          <p:cNvPr id="39" name="椭圆 38">
+            <a:extLst>
+              <a:ext uri="{FF2B5EF4-FFF2-40B4-BE49-F238E27FC236}">
+                <a16:creationId xmlns:a16="http://schemas.microsoft.com/office/drawing/2014/main" id="{E8E85074-40BE-4085-91DA-B64B0F42212B}"/>
+              </a:ext>
+            </a:extLst>
+          </p:cNvPr>
+          <p:cNvSpPr>
+            <a:spLocks noChangeAspect="1"/>
+          </p:cNvSpPr>
+          <p:nvPr/>
+        </p:nvSpPr>
+        <p:spPr>
+          <a:xfrm>
+            <a:off x="6105402" y="2495658"/>
+            <a:ext cx="103124" cy="103124"/>
+          </a:xfrm>
+          <a:prstGeom prst="ellipse">
+            <a:avLst/>
+          </a:prstGeom>
+          <a:solidFill>
+            <a:srgbClr val="FFC000"/>
+          </a:solidFill>
+          <a:ln w="25400">
+            <a:solidFill>
+              <a:schemeClr val="bg1"/>
+            </a:solidFill>
+          </a:ln>
+        </p:spPr>
+        <p:style>
+          <a:lnRef idx="2">
+            <a:schemeClr val="accent1">
+              <a:shade val="50000"/>
+            </a:schemeClr>
+          </a:lnRef>
+          <a:fillRef idx="1">
+            <a:schemeClr val="accent1"/>
+          </a:fillRef>
+          <a:effectRef idx="0">
+            <a:schemeClr val="accent1"/>
+          </a:effectRef>
+          <a:fontRef idx="minor">
+            <a:schemeClr val="lt1"/>
+          </a:fontRef>
+        </p:style>
+        <p:txBody>
+          <a:bodyPr rtlCol="0" anchor="ctr"/>
+          <a:lstStyle/>
+          <a:p>
+            <a:pPr algn="ctr"/>
+            <a:endParaRPr lang="en-US"/>
+          </a:p>
+        </p:txBody>
+      </p:sp>
+      <p:sp>
+        <p:nvSpPr>
+          <p:cNvPr id="40" name="椭圆 39">
+            <a:extLst>
+              <a:ext uri="{FF2B5EF4-FFF2-40B4-BE49-F238E27FC236}">
+                <a16:creationId xmlns:a16="http://schemas.microsoft.com/office/drawing/2014/main" id="{80764EC2-063F-4C10-BB93-30EDDB5F4245}"/>
+              </a:ext>
+            </a:extLst>
+          </p:cNvPr>
+          <p:cNvSpPr>
+            <a:spLocks noChangeAspect="1"/>
+          </p:cNvSpPr>
+          <p:nvPr/>
+        </p:nvSpPr>
+        <p:spPr>
+          <a:xfrm>
+            <a:off x="6507181" y="2495658"/>
+            <a:ext cx="103124" cy="103124"/>
+          </a:xfrm>
+          <a:prstGeom prst="ellipse">
+            <a:avLst/>
+          </a:prstGeom>
+          <a:solidFill>
+            <a:srgbClr val="FFC000"/>
+          </a:solidFill>
+          <a:ln w="25400">
+            <a:solidFill>
+              <a:schemeClr val="bg1"/>
+            </a:solidFill>
+          </a:ln>
+        </p:spPr>
+        <p:style>
+          <a:lnRef idx="2">
+            <a:schemeClr val="accent1">
+              <a:shade val="50000"/>
+            </a:schemeClr>
+          </a:lnRef>
+          <a:fillRef idx="1">
+            <a:schemeClr val="accent1"/>
+          </a:fillRef>
+          <a:effectRef idx="0">
+            <a:schemeClr val="accent1"/>
+          </a:effectRef>
+          <a:fontRef idx="minor">
+            <a:schemeClr val="lt1"/>
+          </a:fontRef>
+        </p:style>
+        <p:txBody>
+          <a:bodyPr rtlCol="0" anchor="ctr"/>
+          <a:lstStyle/>
+          <a:p>
+            <a:pPr algn="ctr"/>
+            <a:endParaRPr lang="en-US"/>
+          </a:p>
+        </p:txBody>
+      </p:sp>
+      <p:sp>
+        <p:nvSpPr>
+          <p:cNvPr id="41" name="椭圆 40">
+            <a:extLst>
+              <a:ext uri="{FF2B5EF4-FFF2-40B4-BE49-F238E27FC236}">
+                <a16:creationId xmlns:a16="http://schemas.microsoft.com/office/drawing/2014/main" id="{2068334C-6FE8-4C13-A95F-EBAAFA2BE8A3}"/>
+              </a:ext>
+            </a:extLst>
+          </p:cNvPr>
+          <p:cNvSpPr>
+            <a:spLocks noChangeAspect="1"/>
+          </p:cNvSpPr>
+          <p:nvPr/>
+        </p:nvSpPr>
+        <p:spPr>
+          <a:xfrm>
+            <a:off x="7898917" y="2141168"/>
+            <a:ext cx="103124" cy="103124"/>
+          </a:xfrm>
+          <a:prstGeom prst="ellipse">
+            <a:avLst/>
+          </a:prstGeom>
+          <a:solidFill>
+            <a:srgbClr val="FFC000"/>
+          </a:solidFill>
+          <a:ln w="25400">
+            <a:solidFill>
+              <a:schemeClr val="bg1"/>
+            </a:solidFill>
+          </a:ln>
+        </p:spPr>
+        <p:style>
+          <a:lnRef idx="2">
+            <a:schemeClr val="accent1">
+              <a:shade val="50000"/>
+            </a:schemeClr>
+          </a:lnRef>
+          <a:fillRef idx="1">
+            <a:schemeClr val="accent1"/>
+          </a:fillRef>
+          <a:effectRef idx="0">
+            <a:schemeClr val="accent1"/>
+          </a:effectRef>
+          <a:fontRef idx="minor">
+            <a:schemeClr val="lt1"/>
+          </a:fontRef>
+        </p:style>
+        <p:txBody>
+          <a:bodyPr rtlCol="0" anchor="ctr"/>
+          <a:lstStyle/>
+          <a:p>
+            <a:pPr algn="ctr"/>
+            <a:endParaRPr lang="en-US"/>
+          </a:p>
+        </p:txBody>
+      </p:sp>
+      <p:cxnSp>
+        <p:nvCxnSpPr>
+          <p:cNvPr id="11" name="直接连接符 10">
+            <a:extLst>
+              <a:ext uri="{FF2B5EF4-FFF2-40B4-BE49-F238E27FC236}">
+                <a16:creationId xmlns:a16="http://schemas.microsoft.com/office/drawing/2014/main" id="{F23AAD6E-962D-479C-AAA2-96812B3D9D0D}"/>
+              </a:ext>
+            </a:extLst>
+          </p:cNvPr>
+          <p:cNvCxnSpPr>
+            <a:cxnSpLocks/>
+          </p:cNvCxnSpPr>
+          <p:nvPr/>
+        </p:nvCxnSpPr>
+        <p:spPr>
+          <a:xfrm>
+            <a:off x="8002041" y="2244292"/>
+            <a:ext cx="891749" cy="1055401"/>
+          </a:xfrm>
+          <a:prstGeom prst="line">
+            <a:avLst/>
+          </a:prstGeom>
+          <a:ln w="15875" cap="flat" cmpd="sng" algn="ctr">
+            <a:solidFill>
+              <a:schemeClr val="bg1">
+                <a:lumMod val="85000"/>
+              </a:schemeClr>
+            </a:solidFill>
+            <a:prstDash val="dash"/>
+            <a:round/>
+            <a:headEnd type="none" w="med" len="med"/>
+            <a:tailEnd type="none" w="med" len="med"/>
+          </a:ln>
+        </p:spPr>
+        <p:style>
+          <a:lnRef idx="0">
+            <a:scrgbClr r="0" g="0" b="0"/>
+          </a:lnRef>
+          <a:fillRef idx="0">
+            <a:scrgbClr r="0" g="0" b="0"/>
+          </a:fillRef>
+          <a:effectRef idx="0">
+            <a:scrgbClr r="0" g="0" b="0"/>
+          </a:effectRef>
+          <a:fontRef idx="minor">
+            <a:schemeClr val="tx1"/>
+          </a:fontRef>
+        </p:style>
+      </p:cxnSp>
+      <p:sp>
+        <p:nvSpPr>
+          <p:cNvPr id="12" name="矩形 11">
+            <a:extLst>
+              <a:ext uri="{FF2B5EF4-FFF2-40B4-BE49-F238E27FC236}">
+                <a16:creationId xmlns:a16="http://schemas.microsoft.com/office/drawing/2014/main" id="{4C97324C-4AD8-45C2-BD7B-DD7249D681B4}"/>
+              </a:ext>
+            </a:extLst>
+          </p:cNvPr>
+          <p:cNvSpPr/>
+          <p:nvPr/>
+        </p:nvSpPr>
+        <p:spPr>
+          <a:xfrm>
+            <a:off x="6023080" y="1904246"/>
+            <a:ext cx="684409" cy="844974"/>
+          </a:xfrm>
+          <a:prstGeom prst="rect">
+            <a:avLst/>
+          </a:prstGeom>
+          <a:noFill/>
+          <a:ln w="34925">
+            <a:solidFill>
+              <a:srgbClr val="FFC000"/>
+            </a:solidFill>
+          </a:ln>
+        </p:spPr>
+        <p:style>
+          <a:lnRef idx="2">
+            <a:schemeClr val="accent1">
+              <a:shade val="50000"/>
+            </a:schemeClr>
+          </a:lnRef>
+          <a:fillRef idx="1">
+            <a:schemeClr val="accent1"/>
+          </a:fillRef>
+          <a:effectRef idx="0">
+            <a:schemeClr val="accent1"/>
+          </a:effectRef>
+          <a:fontRef idx="minor">
+            <a:schemeClr val="lt1"/>
+          </a:fontRef>
+        </p:style>
+        <p:txBody>
+          <a:bodyPr rtlCol="0" anchor="ctr"/>
+          <a:lstStyle/>
+          <a:p>
+            <a:pPr algn="ctr"/>
+            <a:endParaRPr lang="en-US"/>
+          </a:p>
+        </p:txBody>
+      </p:sp>
+      <p:cxnSp>
+        <p:nvCxnSpPr>
+          <p:cNvPr id="16" name="直接连接符 15">
+            <a:extLst>
+              <a:ext uri="{FF2B5EF4-FFF2-40B4-BE49-F238E27FC236}">
+                <a16:creationId xmlns:a16="http://schemas.microsoft.com/office/drawing/2014/main" id="{ACAA32BB-8BF3-4A83-9324-2C6DC41ADA91}"/>
+              </a:ext>
+            </a:extLst>
+          </p:cNvPr>
+          <p:cNvCxnSpPr>
+            <a:cxnSpLocks/>
+          </p:cNvCxnSpPr>
+          <p:nvPr/>
+        </p:nvCxnSpPr>
+        <p:spPr>
+          <a:xfrm>
+            <a:off x="8893790" y="3299693"/>
+            <a:ext cx="416466" cy="0"/>
+          </a:xfrm>
+          <a:prstGeom prst="line">
+            <a:avLst/>
+          </a:prstGeom>
+          <a:ln w="15875">
+            <a:solidFill>
+              <a:schemeClr val="bg1">
+                <a:lumMod val="85000"/>
+              </a:schemeClr>
+            </a:solidFill>
+            <a:prstDash val="dash"/>
+          </a:ln>
+        </p:spPr>
+        <p:style>
+          <a:lnRef idx="1">
+            <a:schemeClr val="accent1"/>
+          </a:lnRef>
+          <a:fillRef idx="0">
+            <a:schemeClr val="accent1"/>
+          </a:fillRef>
+          <a:effectRef idx="0">
+            <a:schemeClr val="accent1"/>
+          </a:effectRef>
+          <a:fontRef idx="minor">
+            <a:schemeClr val="tx1"/>
+          </a:fontRef>
+        </p:style>
+      </p:cxnSp>
+      <p:cxnSp>
+        <p:nvCxnSpPr>
+          <p:cNvPr id="48" name="直接连接符 47">
+            <a:extLst>
+              <a:ext uri="{FF2B5EF4-FFF2-40B4-BE49-F238E27FC236}">
+                <a16:creationId xmlns:a16="http://schemas.microsoft.com/office/drawing/2014/main" id="{1670675D-8898-48C2-93BA-75AA88FA6AAA}"/>
+              </a:ext>
+            </a:extLst>
+          </p:cNvPr>
+          <p:cNvCxnSpPr>
+            <a:cxnSpLocks/>
+          </p:cNvCxnSpPr>
+          <p:nvPr/>
+        </p:nvCxnSpPr>
+        <p:spPr>
+          <a:xfrm flipV="1">
+            <a:off x="6707489" y="641418"/>
+            <a:ext cx="1242990" cy="1241000"/>
+          </a:xfrm>
+          <a:prstGeom prst="line">
+            <a:avLst/>
+          </a:prstGeom>
+          <a:ln w="15875" cap="flat" cmpd="sng" algn="ctr">
+            <a:solidFill>
+              <a:schemeClr val="bg1">
+                <a:lumMod val="85000"/>
+              </a:schemeClr>
+            </a:solidFill>
+            <a:prstDash val="dash"/>
+            <a:round/>
+            <a:headEnd type="none" w="med" len="med"/>
+            <a:tailEnd type="none" w="med" len="med"/>
+          </a:ln>
+        </p:spPr>
+        <p:style>
+          <a:lnRef idx="0">
+            <a:scrgbClr r="0" g="0" b="0"/>
+          </a:lnRef>
+          <a:fillRef idx="0">
+            <a:scrgbClr r="0" g="0" b="0"/>
+          </a:fillRef>
+          <a:effectRef idx="0">
+            <a:scrgbClr r="0" g="0" b="0"/>
+          </a:effectRef>
+          <a:fontRef idx="minor">
+            <a:schemeClr val="tx1"/>
+          </a:fontRef>
+        </p:style>
+      </p:cxnSp>
+      <p:cxnSp>
+        <p:nvCxnSpPr>
+          <p:cNvPr id="53" name="直接连接符 52">
+            <a:extLst>
+              <a:ext uri="{FF2B5EF4-FFF2-40B4-BE49-F238E27FC236}">
+                <a16:creationId xmlns:a16="http://schemas.microsoft.com/office/drawing/2014/main" id="{4A71FE37-03F7-4228-AD00-573936300570}"/>
+              </a:ext>
+            </a:extLst>
+          </p:cNvPr>
+          <p:cNvCxnSpPr>
+            <a:cxnSpLocks/>
+          </p:cNvCxnSpPr>
+          <p:nvPr/>
+        </p:nvCxnSpPr>
+        <p:spPr>
+          <a:xfrm>
+            <a:off x="7950479" y="641418"/>
+            <a:ext cx="630104" cy="0"/>
+          </a:xfrm>
+          <a:prstGeom prst="line">
+            <a:avLst/>
+          </a:prstGeom>
+          <a:ln w="15875" cap="flat" cmpd="sng" algn="ctr">
+            <a:solidFill>
+              <a:schemeClr val="bg1">
+                <a:lumMod val="85000"/>
+              </a:schemeClr>
+            </a:solidFill>
+            <a:prstDash val="dash"/>
+            <a:round/>
+            <a:headEnd type="none" w="med" len="med"/>
+            <a:tailEnd type="none" w="med" len="med"/>
+          </a:ln>
+        </p:spPr>
+        <p:style>
+          <a:lnRef idx="0">
+            <a:scrgbClr r="0" g="0" b="0"/>
+          </a:lnRef>
+          <a:fillRef idx="0">
+            <a:scrgbClr r="0" g="0" b="0"/>
+          </a:fillRef>
+          <a:effectRef idx="0">
+            <a:scrgbClr r="0" g="0" b="0"/>
+          </a:effectRef>
+          <a:fontRef idx="minor">
+            <a:schemeClr val="tx1"/>
+          </a:fontRef>
+        </p:style>
+      </p:cxnSp>
+      <p:pic>
+        <p:nvPicPr>
+          <p:cNvPr id="60" name="图片 59">
+            <a:extLst>
+              <a:ext uri="{FF2B5EF4-FFF2-40B4-BE49-F238E27FC236}">
+                <a16:creationId xmlns:a16="http://schemas.microsoft.com/office/drawing/2014/main" id="{E62EADCD-48DB-428A-98CE-BC0525981EA1}"/>
+              </a:ext>
+            </a:extLst>
+          </p:cNvPr>
+          <p:cNvPicPr>
+            <a:picLocks noChangeAspect="1"/>
+          </p:cNvPicPr>
+          <p:nvPr/>
+        </p:nvPicPr>
+        <p:blipFill>
+          <a:blip r:embed="rId7">
+            <a:extLst>
+              <a:ext uri="{28A0092B-C50C-407E-A947-70E740481C1C}">
+                <a14:useLocalDpi xmlns:a14="http://schemas.microsoft.com/office/drawing/2010/main" val="0"/>
+              </a:ext>
+            </a:extLst>
+          </a:blip>
+          <a:stretch>
+            <a:fillRect/>
+          </a:stretch>
+        </p:blipFill>
+        <p:spPr>
+          <a:xfrm>
+            <a:off x="9275763" y="3036635"/>
+            <a:ext cx="472059" cy="472059"/>
+          </a:xfrm>
+          <a:prstGeom prst="rect">
+            <a:avLst/>
+          </a:prstGeom>
+        </p:spPr>
+      </p:pic>
+      <p:pic>
+        <p:nvPicPr>
+          <p:cNvPr id="66" name="图片 65">
+            <a:extLst>
+              <a:ext uri="{FF2B5EF4-FFF2-40B4-BE49-F238E27FC236}">
+                <a16:creationId xmlns:a16="http://schemas.microsoft.com/office/drawing/2014/main" id="{397DFC32-6346-4CB6-8CBA-169B9BE04987}"/>
+              </a:ext>
+            </a:extLst>
+          </p:cNvPr>
+          <p:cNvPicPr>
+            <a:picLocks noChangeAspect="1"/>
+          </p:cNvPicPr>
+          <p:nvPr/>
+        </p:nvPicPr>
+        <p:blipFill>
+          <a:blip r:embed="rId3">
+            <a:extLst>
+              <a:ext uri="{28A0092B-C50C-407E-A947-70E740481C1C}">
+                <a14:useLocalDpi xmlns:a14="http://schemas.microsoft.com/office/drawing/2010/main" val="0"/>
+              </a:ext>
+            </a:extLst>
+          </a:blip>
+          <a:stretch>
+            <a:fillRect/>
+          </a:stretch>
+        </p:blipFill>
+        <p:spPr>
+          <a:xfrm>
+            <a:off x="5424268" y="4827169"/>
+            <a:ext cx="265176" cy="265176"/>
+          </a:xfrm>
+          <a:prstGeom prst="rect">
+            <a:avLst/>
+          </a:prstGeom>
+        </p:spPr>
+      </p:pic>
+      <p:pic>
+        <p:nvPicPr>
+          <p:cNvPr id="67" name="图片 66">
+            <a:extLst>
+              <a:ext uri="{FF2B5EF4-FFF2-40B4-BE49-F238E27FC236}">
+                <a16:creationId xmlns:a16="http://schemas.microsoft.com/office/drawing/2014/main" id="{6D43AF69-63F5-4304-9525-E4EE0F4216AA}"/>
+              </a:ext>
+            </a:extLst>
+          </p:cNvPr>
+          <p:cNvPicPr>
+            <a:picLocks noChangeAspect="1"/>
+          </p:cNvPicPr>
+          <p:nvPr/>
+        </p:nvPicPr>
+        <p:blipFill>
+          <a:blip r:embed="rId4">
+            <a:extLst>
+              <a:ext uri="{28A0092B-C50C-407E-A947-70E740481C1C}">
+                <a14:useLocalDpi xmlns:a14="http://schemas.microsoft.com/office/drawing/2010/main" val="0"/>
+              </a:ext>
+            </a:extLst>
+          </a:blip>
+          <a:stretch>
+            <a:fillRect/>
+          </a:stretch>
+        </p:blipFill>
+        <p:spPr>
+          <a:xfrm>
+            <a:off x="5424268" y="5472297"/>
+            <a:ext cx="265176" cy="265176"/>
+          </a:xfrm>
+          <a:prstGeom prst="rect">
+            <a:avLst/>
+          </a:prstGeom>
+        </p:spPr>
+      </p:pic>
+      <p:pic>
+        <p:nvPicPr>
+          <p:cNvPr id="68" name="图片 67">
+            <a:extLst>
+              <a:ext uri="{FF2B5EF4-FFF2-40B4-BE49-F238E27FC236}">
+                <a16:creationId xmlns:a16="http://schemas.microsoft.com/office/drawing/2014/main" id="{4033A3C1-B254-4F6B-8047-10BDA263D37C}"/>
+              </a:ext>
+            </a:extLst>
+          </p:cNvPr>
+          <p:cNvPicPr>
+            <a:picLocks noChangeAspect="1"/>
+          </p:cNvPicPr>
+          <p:nvPr/>
+        </p:nvPicPr>
+        <p:blipFill>
+          <a:blip r:embed="rId5">
+            <a:extLst>
+              <a:ext uri="{28A0092B-C50C-407E-A947-70E740481C1C}">
+                <a14:useLocalDpi xmlns:a14="http://schemas.microsoft.com/office/drawing/2010/main" val="0"/>
+              </a:ext>
+            </a:extLst>
+          </a:blip>
+          <a:stretch>
+            <a:fillRect/>
+          </a:stretch>
+        </p:blipFill>
+        <p:spPr>
+          <a:xfrm>
+            <a:off x="5424268" y="5784920"/>
+            <a:ext cx="265176" cy="265176"/>
+          </a:xfrm>
+          <a:prstGeom prst="rect">
+            <a:avLst/>
+          </a:prstGeom>
+        </p:spPr>
+      </p:pic>
+      <p:pic>
+        <p:nvPicPr>
+          <p:cNvPr id="70" name="图片 69">
+            <a:extLst>
+              <a:ext uri="{FF2B5EF4-FFF2-40B4-BE49-F238E27FC236}">
+                <a16:creationId xmlns:a16="http://schemas.microsoft.com/office/drawing/2014/main" id="{F7DE02AD-B78A-46D9-9A9D-FABCB2CF0126}"/>
+              </a:ext>
+            </a:extLst>
+          </p:cNvPr>
+          <p:cNvPicPr>
+            <a:picLocks noChangeAspect="1"/>
+          </p:cNvPicPr>
+          <p:nvPr/>
+        </p:nvPicPr>
+        <p:blipFill>
+          <a:blip r:embed="rId6">
+            <a:extLst>
+              <a:ext uri="{28A0092B-C50C-407E-A947-70E740481C1C}">
+                <a14:useLocalDpi xmlns:a14="http://schemas.microsoft.com/office/drawing/2010/main" val="0"/>
+              </a:ext>
+            </a:extLst>
+          </a:blip>
+          <a:stretch>
+            <a:fillRect/>
+          </a:stretch>
+        </p:blipFill>
+        <p:spPr>
+          <a:xfrm>
+            <a:off x="5424268" y="6097543"/>
+            <a:ext cx="265176" cy="265176"/>
+          </a:xfrm>
+          <a:prstGeom prst="rect">
+            <a:avLst/>
+          </a:prstGeom>
+        </p:spPr>
+      </p:pic>
+      <p:pic>
+        <p:nvPicPr>
+          <p:cNvPr id="71" name="图片 70">
+            <a:extLst>
+              <a:ext uri="{FF2B5EF4-FFF2-40B4-BE49-F238E27FC236}">
+                <a16:creationId xmlns:a16="http://schemas.microsoft.com/office/drawing/2014/main" id="{A9EAAC09-3F19-42F5-991F-ACBDD67CB53D}"/>
+              </a:ext>
+            </a:extLst>
+          </p:cNvPr>
+          <p:cNvPicPr>
+            <a:picLocks noChangeAspect="1"/>
+          </p:cNvPicPr>
+          <p:nvPr/>
+        </p:nvPicPr>
+        <p:blipFill>
+          <a:blip r:embed="rId7">
+            <a:extLst>
+              <a:ext uri="{28A0092B-C50C-407E-A947-70E740481C1C}">
+                <a14:useLocalDpi xmlns:a14="http://schemas.microsoft.com/office/drawing/2010/main" val="0"/>
+              </a:ext>
+            </a:extLst>
+          </a:blip>
+          <a:stretch>
+            <a:fillRect/>
+          </a:stretch>
+        </p:blipFill>
+        <p:spPr>
+          <a:xfrm>
+            <a:off x="5424268" y="6410166"/>
+            <a:ext cx="265176" cy="265176"/>
+          </a:xfrm>
+          <a:prstGeom prst="rect">
+            <a:avLst/>
+          </a:prstGeom>
+        </p:spPr>
+      </p:pic>
+      <p:sp>
+        <p:nvSpPr>
+          <p:cNvPr id="72" name="文本框 71">
+            <a:extLst>
+              <a:ext uri="{FF2B5EF4-FFF2-40B4-BE49-F238E27FC236}">
+                <a16:creationId xmlns:a16="http://schemas.microsoft.com/office/drawing/2014/main" id="{C75F2847-9915-4BF7-BD28-9AAAF3EC3617}"/>
+              </a:ext>
+            </a:extLst>
+          </p:cNvPr>
+          <p:cNvSpPr txBox="1"/>
+          <p:nvPr/>
+        </p:nvSpPr>
+        <p:spPr>
+          <a:xfrm>
+            <a:off x="5677437" y="4745189"/>
+            <a:ext cx="5689600" cy="1988301"/>
+          </a:xfrm>
+          <a:prstGeom prst="rect">
+            <a:avLst/>
+          </a:prstGeom>
+          <a:noFill/>
+        </p:spPr>
+        <p:txBody>
+          <a:bodyPr wrap="square" rtlCol="0">
+            <a:spAutoFit/>
+          </a:bodyPr>
+          <a:lstStyle/>
+          <a:p>
+            <a:pPr>
+              <a:lnSpc>
+                <a:spcPts val="2500"/>
+              </a:lnSpc>
+            </a:pPr>
+            <a:r>
+              <a:rPr lang="zh-CN" altLang="en-US" sz="1600" b="1">
+                <a:latin typeface="Leelawadee UI" panose="020B0502040204020203" pitchFamily="34" charset="-34"/>
+                <a:ea typeface="Microsoft JhengHei Light" panose="020B0304030504040204" pitchFamily="34" charset="-120"/>
+                <a:cs typeface="Leelawadee UI" panose="020B0502040204020203" pitchFamily="34" charset="-34"/>
+              </a:rPr>
+              <a:t>电位器</a:t>
+            </a:r>
+            <a:r>
+              <a:rPr lang="en-US" sz="1600">
+                <a:latin typeface="华文楷体" panose="02010600040101010101" pitchFamily="2" charset="-122"/>
+                <a:ea typeface="华文楷体" panose="02010600040101010101" pitchFamily="2" charset="-122"/>
+                <a:cs typeface="Leelawadee UI" panose="020B0502040204020203" pitchFamily="34" charset="-34"/>
+              </a:rPr>
+              <a:t>: </a:t>
+            </a:r>
+            <a:r>
+              <a:rPr lang="zh-CN" altLang="en-US" sz="1600">
+                <a:latin typeface="华文楷体" panose="02010600040101010101" pitchFamily="2" charset="-122"/>
+                <a:ea typeface="华文楷体" panose="02010600040101010101" pitchFamily="2" charset="-122"/>
+                <a:cs typeface="Leelawadee UI" panose="020B0502040204020203" pitchFamily="34" charset="-34"/>
+              </a:rPr>
+              <a:t>您可以使用螺丝刀来旋转电位器，它控制了此模块的灵敏度。</a:t>
+            </a:r>
+            <a:endParaRPr lang="en-US" altLang="zh-CN" sz="1600">
+              <a:latin typeface="华文楷体" panose="02010600040101010101" pitchFamily="2" charset="-122"/>
+              <a:ea typeface="华文楷体" panose="02010600040101010101" pitchFamily="2" charset="-122"/>
+              <a:cs typeface="Leelawadee UI" panose="020B0502040204020203" pitchFamily="34" charset="-34"/>
+            </a:endParaRPr>
+          </a:p>
+          <a:p>
+            <a:pPr>
+              <a:lnSpc>
+                <a:spcPts val="2500"/>
+              </a:lnSpc>
+            </a:pPr>
+            <a:r>
+              <a:rPr lang="en-US" sz="1600" b="1">
+                <a:latin typeface="Leelawadee UI" panose="020B0502040204020203" pitchFamily="34" charset="-34"/>
+                <a:ea typeface="Microsoft JhengHei Light" panose="020B0304030504040204" pitchFamily="34" charset="-120"/>
+                <a:cs typeface="Leelawadee UI" panose="020B0502040204020203" pitchFamily="34" charset="-34"/>
+              </a:rPr>
+              <a:t>GND</a:t>
+            </a:r>
+            <a:r>
+              <a:rPr lang="en-US" sz="1600">
+                <a:latin typeface="华文楷体" panose="02010600040101010101" pitchFamily="2" charset="-122"/>
+                <a:ea typeface="华文楷体" panose="02010600040101010101" pitchFamily="2" charset="-122"/>
+                <a:cs typeface="Leelawadee UI" panose="020B0502040204020203" pitchFamily="34" charset="-34"/>
+              </a:rPr>
+              <a:t>: </a:t>
+            </a:r>
+            <a:r>
+              <a:rPr lang="zh-CN" altLang="en-US" sz="1600">
+                <a:latin typeface="华文楷体" panose="02010600040101010101" pitchFamily="2" charset="-122"/>
+                <a:ea typeface="华文楷体" panose="02010600040101010101" pitchFamily="2" charset="-122"/>
+                <a:cs typeface="Leelawadee UI" panose="020B0502040204020203" pitchFamily="34" charset="-34"/>
+              </a:rPr>
+              <a:t>电位器的 </a:t>
+            </a:r>
+            <a:r>
+              <a:rPr lang="en-US" altLang="zh-CN" sz="1600">
+                <a:latin typeface="华文楷体" panose="02010600040101010101" pitchFamily="2" charset="-122"/>
+                <a:ea typeface="华文楷体" panose="02010600040101010101" pitchFamily="2" charset="-122"/>
+                <a:cs typeface="Leelawadee UI" panose="020B0502040204020203" pitchFamily="34" charset="-34"/>
+              </a:rPr>
+              <a:t>GND </a:t>
+            </a:r>
+            <a:r>
+              <a:rPr lang="zh-CN" altLang="en-US" sz="1600">
+                <a:latin typeface="华文楷体" panose="02010600040101010101" pitchFamily="2" charset="-122"/>
+                <a:ea typeface="华文楷体" panose="02010600040101010101" pitchFamily="2" charset="-122"/>
+                <a:cs typeface="Leelawadee UI" panose="020B0502040204020203" pitchFamily="34" charset="-34"/>
+              </a:rPr>
+              <a:t>引脚</a:t>
+            </a:r>
+            <a:endParaRPr lang="en-US" altLang="zh-CN" sz="1600">
+              <a:latin typeface="华文楷体" panose="02010600040101010101" pitchFamily="2" charset="-122"/>
+              <a:ea typeface="华文楷体" panose="02010600040101010101" pitchFamily="2" charset="-122"/>
+              <a:cs typeface="Leelawadee UI" panose="020B0502040204020203" pitchFamily="34" charset="-34"/>
+            </a:endParaRPr>
+          </a:p>
+          <a:p>
+            <a:pPr>
+              <a:lnSpc>
+                <a:spcPts val="2500"/>
+              </a:lnSpc>
+            </a:pPr>
+            <a:r>
+              <a:rPr lang="en-US" altLang="zh-CN" sz="1600" b="1" err="1">
+                <a:latin typeface="Leelawadee UI" panose="020B0502040204020203" pitchFamily="34" charset="-34"/>
+                <a:ea typeface="Microsoft JhengHei Light" panose="020B0304030504040204" pitchFamily="34" charset="-120"/>
+                <a:cs typeface="Leelawadee UI" panose="020B0502040204020203" pitchFamily="34" charset="-34"/>
+              </a:rPr>
+              <a:t>Vsen</a:t>
+            </a:r>
+            <a:r>
+              <a:rPr lang="en-US" altLang="zh-CN" sz="1600">
+                <a:latin typeface="华文楷体" panose="02010600040101010101" pitchFamily="2" charset="-122"/>
+                <a:ea typeface="华文楷体" panose="02010600040101010101" pitchFamily="2" charset="-122"/>
+                <a:cs typeface="Leelawadee UI" panose="020B0502040204020203" pitchFamily="34" charset="-34"/>
+              </a:rPr>
+              <a:t>: </a:t>
+            </a:r>
+            <a:r>
+              <a:rPr lang="en-US" altLang="zh-CN" sz="1600" err="1">
+                <a:latin typeface="华文楷体" panose="02010600040101010101" pitchFamily="2" charset="-122"/>
+                <a:ea typeface="华文楷体" panose="02010600040101010101" pitchFamily="2" charset="-122"/>
+                <a:cs typeface="Leelawadee UI" panose="020B0502040204020203" pitchFamily="34" charset="-34"/>
+              </a:rPr>
+              <a:t>Vsen</a:t>
+            </a:r>
+            <a:r>
+              <a:rPr lang="en-US" altLang="zh-CN" sz="1600">
+                <a:latin typeface="华文楷体" panose="02010600040101010101" pitchFamily="2" charset="-122"/>
+                <a:ea typeface="华文楷体" panose="02010600040101010101" pitchFamily="2" charset="-122"/>
+                <a:cs typeface="Leelawadee UI" panose="020B0502040204020203" pitchFamily="34" charset="-34"/>
+              </a:rPr>
+              <a:t> </a:t>
+            </a:r>
+            <a:r>
+              <a:rPr lang="zh-CN" altLang="en-US" sz="1600">
+                <a:latin typeface="华文楷体" panose="02010600040101010101" pitchFamily="2" charset="-122"/>
+                <a:ea typeface="华文楷体" panose="02010600040101010101" pitchFamily="2" charset="-122"/>
+                <a:cs typeface="Leelawadee UI" panose="020B0502040204020203" pitchFamily="34" charset="-34"/>
+              </a:rPr>
+              <a:t>的电压越低，传感器的灵敏度越高</a:t>
+            </a:r>
+            <a:endParaRPr lang="en-US" altLang="zh-CN" sz="1600">
+              <a:latin typeface="华文楷体" panose="02010600040101010101" pitchFamily="2" charset="-122"/>
+              <a:ea typeface="华文楷体" panose="02010600040101010101" pitchFamily="2" charset="-122"/>
+              <a:cs typeface="Leelawadee UI" panose="020B0502040204020203" pitchFamily="34" charset="-34"/>
+            </a:endParaRPr>
+          </a:p>
+          <a:p>
+            <a:pPr>
+              <a:lnSpc>
+                <a:spcPts val="2500"/>
+              </a:lnSpc>
+            </a:pPr>
+            <a:r>
+              <a:rPr lang="en-US" sz="1600" b="1">
+                <a:latin typeface="Leelawadee UI" panose="020B0502040204020203" pitchFamily="34" charset="-34"/>
+                <a:ea typeface="Microsoft JhengHei Light" panose="020B0304030504040204" pitchFamily="34" charset="-120"/>
+                <a:cs typeface="Leelawadee UI" panose="020B0502040204020203" pitchFamily="34" charset="-34"/>
+              </a:rPr>
+              <a:t>VCC</a:t>
+            </a:r>
+            <a:r>
+              <a:rPr lang="en-US" sz="1600">
+                <a:latin typeface="华文楷体" panose="02010600040101010101" pitchFamily="2" charset="-122"/>
+                <a:ea typeface="华文楷体" panose="02010600040101010101" pitchFamily="2" charset="-122"/>
+                <a:cs typeface="Leelawadee UI" panose="020B0502040204020203" pitchFamily="34" charset="-34"/>
+              </a:rPr>
+              <a:t>: </a:t>
+            </a:r>
+            <a:r>
+              <a:rPr lang="zh-CN" altLang="en-US" sz="1600">
+                <a:latin typeface="华文楷体" panose="02010600040101010101" pitchFamily="2" charset="-122"/>
+                <a:ea typeface="华文楷体" panose="02010600040101010101" pitchFamily="2" charset="-122"/>
+                <a:cs typeface="Leelawadee UI" panose="020B0502040204020203" pitchFamily="34" charset="-34"/>
+              </a:rPr>
+              <a:t>电位器的 </a:t>
+            </a:r>
+            <a:r>
+              <a:rPr lang="en-US" altLang="zh-CN" sz="1600">
+                <a:latin typeface="华文楷体" panose="02010600040101010101" pitchFamily="2" charset="-122"/>
+                <a:ea typeface="华文楷体" panose="02010600040101010101" pitchFamily="2" charset="-122"/>
+                <a:cs typeface="Leelawadee UI" panose="020B0502040204020203" pitchFamily="34" charset="-34"/>
+              </a:rPr>
+              <a:t>VCC </a:t>
+            </a:r>
+            <a:r>
+              <a:rPr lang="zh-CN" altLang="en-US" sz="1600">
+                <a:latin typeface="华文楷体" panose="02010600040101010101" pitchFamily="2" charset="-122"/>
+                <a:ea typeface="华文楷体" panose="02010600040101010101" pitchFamily="2" charset="-122"/>
+                <a:cs typeface="Leelawadee UI" panose="020B0502040204020203" pitchFamily="34" charset="-34"/>
+              </a:rPr>
+              <a:t>引脚</a:t>
+            </a:r>
+            <a:endParaRPr lang="en-US" altLang="zh-CN" sz="1600">
+              <a:latin typeface="华文楷体" panose="02010600040101010101" pitchFamily="2" charset="-122"/>
+              <a:ea typeface="华文楷体" panose="02010600040101010101" pitchFamily="2" charset="-122"/>
+              <a:cs typeface="Leelawadee UI" panose="020B0502040204020203" pitchFamily="34" charset="-34"/>
+            </a:endParaRPr>
+          </a:p>
+          <a:p>
+            <a:pPr>
+              <a:lnSpc>
+                <a:spcPts val="2500"/>
+              </a:lnSpc>
+            </a:pPr>
+            <a:r>
+              <a:rPr lang="en-US" sz="1600" b="1">
+                <a:latin typeface="Leelawadee UI" panose="020B0502040204020203" pitchFamily="34" charset="-34"/>
+                <a:ea typeface="Microsoft JhengHei Light" panose="020B0304030504040204" pitchFamily="34" charset="-120"/>
+                <a:cs typeface="Leelawadee UI" panose="020B0502040204020203" pitchFamily="34" charset="-34"/>
+              </a:rPr>
+              <a:t>SW-420</a:t>
+            </a:r>
+            <a:r>
+              <a:rPr lang="en-US" sz="1600">
+                <a:latin typeface="华文楷体" panose="02010600040101010101" pitchFamily="2" charset="-122"/>
+                <a:ea typeface="华文楷体" panose="02010600040101010101" pitchFamily="2" charset="-122"/>
+                <a:cs typeface="Leelawadee UI" panose="020B0502040204020203" pitchFamily="34" charset="-34"/>
+              </a:rPr>
+              <a:t>: </a:t>
+            </a:r>
+            <a:r>
+              <a:rPr lang="zh-CN" altLang="en-US" sz="1600">
+                <a:latin typeface="华文楷体" panose="02010600040101010101" pitchFamily="2" charset="-122"/>
+                <a:ea typeface="华文楷体" panose="02010600040101010101" pitchFamily="2" charset="-122"/>
+                <a:cs typeface="Leelawadee UI" panose="020B0502040204020203" pitchFamily="34" charset="-34"/>
+              </a:rPr>
+              <a:t>振动传感器</a:t>
+            </a:r>
+            <a:endParaRPr lang="en-US">
+              <a:latin typeface="华文楷体" panose="02010600040101010101" pitchFamily="2" charset="-122"/>
+              <a:ea typeface="华文楷体" panose="02010600040101010101" pitchFamily="2" charset="-122"/>
+            </a:endParaRPr>
+          </a:p>
+        </p:txBody>
+      </p:sp>
+      <p:grpSp>
+        <p:nvGrpSpPr>
+          <p:cNvPr id="79" name="组合 78">
+            <a:extLst>
+              <a:ext uri="{FF2B5EF4-FFF2-40B4-BE49-F238E27FC236}">
+                <a16:creationId xmlns:a16="http://schemas.microsoft.com/office/drawing/2014/main" id="{2104ED9B-FADE-40E3-B011-506408B94823}"/>
+              </a:ext>
+            </a:extLst>
+          </p:cNvPr>
+          <p:cNvGrpSpPr/>
+          <p:nvPr/>
+        </p:nvGrpSpPr>
+        <p:grpSpPr>
+          <a:xfrm>
+            <a:off x="1370264" y="4160042"/>
+            <a:ext cx="266700" cy="1217219"/>
+            <a:chOff x="6884220" y="1641910"/>
+            <a:chExt cx="266700" cy="1217219"/>
+          </a:xfrm>
+        </p:grpSpPr>
+        <p:pic>
+          <p:nvPicPr>
+            <p:cNvPr id="80" name="图片 79">
+              <a:extLst>
+                <a:ext uri="{FF2B5EF4-FFF2-40B4-BE49-F238E27FC236}">
+                  <a16:creationId xmlns:a16="http://schemas.microsoft.com/office/drawing/2014/main" id="{6BF4E1D3-9B3C-4AD8-AC10-EE22E695BD37}"/>
+                </a:ext>
+              </a:extLst>
+            </p:cNvPr>
+            <p:cNvPicPr>
+              <a:picLocks noChangeAspect="1"/>
+            </p:cNvPicPr>
+            <p:nvPr/>
+          </p:nvPicPr>
+          <p:blipFill>
+            <a:blip r:embed="rId8">
+              <a:extLst>
+                <a:ext uri="{28A0092B-C50C-407E-A947-70E740481C1C}">
+                  <a14:useLocalDpi xmlns:a14="http://schemas.microsoft.com/office/drawing/2010/main" val="0"/>
+                </a:ext>
+              </a:extLst>
+            </a:blip>
+            <a:stretch>
+              <a:fillRect/>
+            </a:stretch>
+          </p:blipFill>
+          <p:spPr>
+            <a:xfrm>
+              <a:off x="6884220" y="1958750"/>
+              <a:ext cx="266700" cy="266700"/>
+            </a:xfrm>
+            <a:prstGeom prst="rect">
+              <a:avLst/>
+            </a:prstGeom>
+          </p:spPr>
+        </p:pic>
+        <p:pic>
+          <p:nvPicPr>
+            <p:cNvPr id="81" name="图片 80">
+              <a:extLst>
+                <a:ext uri="{FF2B5EF4-FFF2-40B4-BE49-F238E27FC236}">
+                  <a16:creationId xmlns:a16="http://schemas.microsoft.com/office/drawing/2014/main" id="{41AFE91E-B19F-4FAE-9253-A809A5B51781}"/>
+                </a:ext>
+              </a:extLst>
+            </p:cNvPr>
+            <p:cNvPicPr>
+              <a:picLocks noChangeAspect="1"/>
+            </p:cNvPicPr>
+            <p:nvPr/>
+          </p:nvPicPr>
+          <p:blipFill>
+            <a:blip r:embed="rId9">
+              <a:extLst>
+                <a:ext uri="{28A0092B-C50C-407E-A947-70E740481C1C}">
+                  <a14:useLocalDpi xmlns:a14="http://schemas.microsoft.com/office/drawing/2010/main" val="0"/>
+                </a:ext>
+              </a:extLst>
+            </a:blip>
+            <a:stretch>
+              <a:fillRect/>
+            </a:stretch>
+          </p:blipFill>
+          <p:spPr>
+            <a:xfrm>
+              <a:off x="6884220" y="1641910"/>
+              <a:ext cx="266700" cy="266700"/>
+            </a:xfrm>
+            <a:prstGeom prst="rect">
+              <a:avLst/>
+            </a:prstGeom>
+          </p:spPr>
+        </p:pic>
+        <p:pic>
+          <p:nvPicPr>
+            <p:cNvPr id="82" name="图片 81">
+              <a:extLst>
+                <a:ext uri="{FF2B5EF4-FFF2-40B4-BE49-F238E27FC236}">
+                  <a16:creationId xmlns:a16="http://schemas.microsoft.com/office/drawing/2014/main" id="{8E43279F-585C-4D57-8809-2F90D157E993}"/>
+                </a:ext>
+              </a:extLst>
+            </p:cNvPr>
+            <p:cNvPicPr>
+              <a:picLocks noChangeAspect="1"/>
+            </p:cNvPicPr>
+            <p:nvPr/>
+          </p:nvPicPr>
+          <p:blipFill>
+            <a:blip r:embed="rId10">
+              <a:extLst>
+                <a:ext uri="{28A0092B-C50C-407E-A947-70E740481C1C}">
+                  <a14:useLocalDpi xmlns:a14="http://schemas.microsoft.com/office/drawing/2010/main" val="0"/>
+                </a:ext>
+              </a:extLst>
+            </a:blip>
+            <a:stretch>
+              <a:fillRect/>
+            </a:stretch>
+          </p:blipFill>
+          <p:spPr>
+            <a:xfrm>
+              <a:off x="6884220" y="2592429"/>
+              <a:ext cx="266700" cy="266700"/>
+            </a:xfrm>
+            <a:prstGeom prst="rect">
+              <a:avLst/>
+            </a:prstGeom>
+          </p:spPr>
+        </p:pic>
+        <p:pic>
+          <p:nvPicPr>
+            <p:cNvPr id="84" name="图片 83">
+              <a:extLst>
+                <a:ext uri="{FF2B5EF4-FFF2-40B4-BE49-F238E27FC236}">
+                  <a16:creationId xmlns:a16="http://schemas.microsoft.com/office/drawing/2014/main" id="{D470A0F8-3A59-4C81-BD8C-BB2D17BC281C}"/>
+                </a:ext>
+              </a:extLst>
+            </p:cNvPr>
+            <p:cNvPicPr>
+              <a:picLocks noChangeAspect="1"/>
+            </p:cNvPicPr>
+            <p:nvPr/>
+          </p:nvPicPr>
+          <p:blipFill>
+            <a:blip r:embed="rId11">
+              <a:extLst>
+                <a:ext uri="{28A0092B-C50C-407E-A947-70E740481C1C}">
+                  <a14:useLocalDpi xmlns:a14="http://schemas.microsoft.com/office/drawing/2010/main" val="0"/>
+                </a:ext>
+              </a:extLst>
+            </a:blip>
+            <a:stretch>
+              <a:fillRect/>
+            </a:stretch>
+          </p:blipFill>
+          <p:spPr>
+            <a:xfrm>
+              <a:off x="6884220" y="2275589"/>
+              <a:ext cx="266700" cy="266700"/>
+            </a:xfrm>
+            <a:prstGeom prst="rect">
+              <a:avLst/>
+            </a:prstGeom>
+          </p:spPr>
+        </p:pic>
+      </p:grpSp>
+      <p:grpSp>
+        <p:nvGrpSpPr>
+          <p:cNvPr id="85" name="组合 84">
+            <a:extLst>
+              <a:ext uri="{FF2B5EF4-FFF2-40B4-BE49-F238E27FC236}">
+                <a16:creationId xmlns:a16="http://schemas.microsoft.com/office/drawing/2014/main" id="{BB3B2951-60E5-415E-A9C6-CF9174E31D62}"/>
+              </a:ext>
+            </a:extLst>
+          </p:cNvPr>
+          <p:cNvGrpSpPr/>
+          <p:nvPr/>
+        </p:nvGrpSpPr>
+        <p:grpSpPr>
+          <a:xfrm>
+            <a:off x="2438910" y="1215868"/>
+            <a:ext cx="476250" cy="1886426"/>
+            <a:chOff x="2261625" y="1357253"/>
+            <a:chExt cx="476250" cy="1886426"/>
+          </a:xfrm>
+        </p:grpSpPr>
+        <p:pic>
+          <p:nvPicPr>
+            <p:cNvPr id="87" name="图片 86">
+              <a:extLst>
+                <a:ext uri="{FF2B5EF4-FFF2-40B4-BE49-F238E27FC236}">
+                  <a16:creationId xmlns:a16="http://schemas.microsoft.com/office/drawing/2014/main" id="{7387EFAC-A049-4EEA-9615-727CEC09563A}"/>
+                </a:ext>
+              </a:extLst>
+            </p:cNvPr>
+            <p:cNvPicPr>
+              <a:picLocks noChangeAspect="1"/>
+            </p:cNvPicPr>
+            <p:nvPr/>
+          </p:nvPicPr>
+          <p:blipFill>
+            <a:blip r:embed="rId8">
+              <a:extLst>
+                <a:ext uri="{28A0092B-C50C-407E-A947-70E740481C1C}">
+                  <a14:useLocalDpi xmlns:a14="http://schemas.microsoft.com/office/drawing/2010/main" val="0"/>
+                </a:ext>
+              </a:extLst>
+            </a:blip>
+            <a:stretch>
+              <a:fillRect/>
+            </a:stretch>
+          </p:blipFill>
+          <p:spPr>
+            <a:xfrm>
+              <a:off x="2261625" y="1827312"/>
+              <a:ext cx="476250" cy="476250"/>
+            </a:xfrm>
+            <a:prstGeom prst="rect">
+              <a:avLst/>
+            </a:prstGeom>
+          </p:spPr>
+        </p:pic>
+        <p:pic>
+          <p:nvPicPr>
+            <p:cNvPr id="88" name="图片 87">
+              <a:extLst>
+                <a:ext uri="{FF2B5EF4-FFF2-40B4-BE49-F238E27FC236}">
+                  <a16:creationId xmlns:a16="http://schemas.microsoft.com/office/drawing/2014/main" id="{1C5042F9-22F9-487E-B903-8296CC1E751F}"/>
+                </a:ext>
+              </a:extLst>
+            </p:cNvPr>
+            <p:cNvPicPr>
+              <a:picLocks noChangeAspect="1"/>
+            </p:cNvPicPr>
+            <p:nvPr/>
+          </p:nvPicPr>
+          <p:blipFill>
+            <a:blip r:embed="rId9">
+              <a:extLst>
+                <a:ext uri="{28A0092B-C50C-407E-A947-70E740481C1C}">
+                  <a14:useLocalDpi xmlns:a14="http://schemas.microsoft.com/office/drawing/2010/main" val="0"/>
+                </a:ext>
+              </a:extLst>
+            </a:blip>
+            <a:stretch>
+              <a:fillRect/>
+            </a:stretch>
+          </p:blipFill>
+          <p:spPr>
+            <a:xfrm>
+              <a:off x="2261625" y="1357253"/>
+              <a:ext cx="476250" cy="476250"/>
+            </a:xfrm>
+            <a:prstGeom prst="rect">
+              <a:avLst/>
+            </a:prstGeom>
+          </p:spPr>
+        </p:pic>
+        <p:pic>
+          <p:nvPicPr>
+            <p:cNvPr id="89" name="图片 88">
+              <a:extLst>
+                <a:ext uri="{FF2B5EF4-FFF2-40B4-BE49-F238E27FC236}">
+                  <a16:creationId xmlns:a16="http://schemas.microsoft.com/office/drawing/2014/main" id="{626C8167-3CEC-418C-B58F-D44423243D8C}"/>
+                </a:ext>
+              </a:extLst>
+            </p:cNvPr>
+            <p:cNvPicPr>
+              <a:picLocks noChangeAspect="1"/>
+            </p:cNvPicPr>
+            <p:nvPr/>
+          </p:nvPicPr>
+          <p:blipFill>
+            <a:blip r:embed="rId10">
+              <a:extLst>
+                <a:ext uri="{28A0092B-C50C-407E-A947-70E740481C1C}">
+                  <a14:useLocalDpi xmlns:a14="http://schemas.microsoft.com/office/drawing/2010/main" val="0"/>
+                </a:ext>
+              </a:extLst>
+            </a:blip>
+            <a:stretch>
+              <a:fillRect/>
+            </a:stretch>
+          </p:blipFill>
+          <p:spPr>
+            <a:xfrm>
+              <a:off x="2261625" y="2767429"/>
+              <a:ext cx="476250" cy="476250"/>
+            </a:xfrm>
+            <a:prstGeom prst="rect">
+              <a:avLst/>
+            </a:prstGeom>
+          </p:spPr>
+        </p:pic>
+        <p:pic>
+          <p:nvPicPr>
+            <p:cNvPr id="90" name="图片 89">
+              <a:extLst>
+                <a:ext uri="{FF2B5EF4-FFF2-40B4-BE49-F238E27FC236}">
+                  <a16:creationId xmlns:a16="http://schemas.microsoft.com/office/drawing/2014/main" id="{CDBABC00-DC94-4CA4-B385-9FEAEDBBC45D}"/>
+                </a:ext>
+              </a:extLst>
+            </p:cNvPr>
+            <p:cNvPicPr>
+              <a:picLocks noChangeAspect="1"/>
+            </p:cNvPicPr>
+            <p:nvPr/>
+          </p:nvPicPr>
+          <p:blipFill>
+            <a:blip r:embed="rId11">
+              <a:extLst>
+                <a:ext uri="{28A0092B-C50C-407E-A947-70E740481C1C}">
+                  <a14:useLocalDpi xmlns:a14="http://schemas.microsoft.com/office/drawing/2010/main" val="0"/>
+                </a:ext>
+              </a:extLst>
+            </a:blip>
+            <a:stretch>
+              <a:fillRect/>
+            </a:stretch>
+          </p:blipFill>
+          <p:spPr>
+            <a:xfrm>
+              <a:off x="2261625" y="2297371"/>
+              <a:ext cx="476250" cy="476250"/>
+            </a:xfrm>
+            <a:prstGeom prst="rect">
+              <a:avLst/>
+            </a:prstGeom>
+          </p:spPr>
+        </p:pic>
+      </p:grpSp>
+    </p:spTree>
+    <p:extLst>
+      <p:ext uri="{BB962C8B-B14F-4D97-AF65-F5344CB8AC3E}">
+        <p14:creationId xmlns:p14="http://schemas.microsoft.com/office/powerpoint/2010/main" val="4121222082"/>
+      </p:ext>
+    </p:extLst>
+  </p:cSld>
+  <p:clrMapOvr>
+    <a:masterClrMapping/>
+  </p:clrMapOvr>
+</p:sld>
+</file>
+
 <file path=ppt/theme/theme1.xml><?xml version="1.0" encoding="utf-8"?>
 <a:theme xmlns:a="http://schemas.openxmlformats.org/drawingml/2006/main" name="Office 主题​​">
   <a:themeElements>

</xml_diff>